<commit_message>
Improved expectimax. Improved poster.
</commit_message>
<xml_diff>
--- a/docs/poster.pptx
+++ b/docs/poster.pptx
@@ -352,7 +352,7 @@
                 <c:formatCode>General</c:formatCode>
                 <c:ptCount val="4"/>
                 <c:pt idx="0">
-                  <c:v>0.54</c:v>
+                  <c:v>0.44</c:v>
                 </c:pt>
               </c:numCache>
             </c:numRef>
@@ -387,6 +387,63 @@
             <a:effectLst/>
           </c:spPr>
           <c:invertIfNegative val="0"/>
+          <c:dLbls>
+            <c:spPr>
+              <a:noFill/>
+              <a:ln>
+                <a:noFill/>
+              </a:ln>
+              <a:effectLst/>
+            </c:spPr>
+            <c:txPr>
+              <a:bodyPr rot="0" spcFirstLastPara="1" vertOverflow="ellipsis" vert="horz" wrap="square" lIns="38100" tIns="19050" rIns="38100" bIns="19050" anchor="ctr" anchorCtr="1">
+                <a:spAutoFit/>
+              </a:bodyPr>
+              <a:lstStyle/>
+              <a:p>
+                <a:pPr>
+                  <a:defRPr sz="1197" b="0" i="0" u="none" strike="noStrike" kern="1200" baseline="0">
+                    <a:solidFill>
+                      <a:schemeClr val="tx1">
+                        <a:lumMod val="75000"/>
+                        <a:lumOff val="25000"/>
+                      </a:schemeClr>
+                    </a:solidFill>
+                    <a:latin typeface="+mn-lt"/>
+                    <a:ea typeface="+mn-ea"/>
+                    <a:cs typeface="+mn-cs"/>
+                  </a:defRPr>
+                </a:pPr>
+                <a:endParaRPr lang="sr-Latn-RS"/>
+              </a:p>
+            </c:txPr>
+            <c:showLegendKey val="0"/>
+            <c:showVal val="1"/>
+            <c:showCatName val="0"/>
+            <c:showSerName val="0"/>
+            <c:showPercent val="0"/>
+            <c:showBubbleSize val="0"/>
+            <c:showLeaderLines val="0"/>
+            <c:extLst>
+              <c:ext xmlns:c15="http://schemas.microsoft.com/office/drawing/2012/chart" uri="{CE6537A1-D6FC-4f65-9D91-7224C49458BB}">
+                <c15:showLeaderLines val="1"/>
+                <c15:leaderLines>
+                  <c:spPr>
+                    <a:ln w="9525" cap="flat" cmpd="sng" algn="ctr">
+                      <a:solidFill>
+                        <a:schemeClr val="tx1">
+                          <a:lumMod val="35000"/>
+                          <a:lumOff val="65000"/>
+                        </a:schemeClr>
+                      </a:solidFill>
+                      <a:round/>
+                    </a:ln>
+                    <a:effectLst/>
+                  </c:spPr>
+                </c15:leaderLines>
+              </c:ext>
+            </c:extLst>
+          </c:dLbls>
           <c:cat>
             <c:strRef>
               <c:f>Sheet1!$A$2:$A$5</c:f>
@@ -405,7 +462,7 @@
                 <c:formatCode>General</c:formatCode>
                 <c:ptCount val="4"/>
                 <c:pt idx="0">
-                  <c:v>2</c:v>
+                  <c:v>0.57999999999999996</c:v>
                 </c:pt>
               </c:numCache>
             </c:numRef>
@@ -4550,7 +4607,7 @@
         </p:nvSpPr>
         <p:spPr>
           <a:xfrm>
-            <a:off x="6470901" y="5708385"/>
+            <a:off x="6470901" y="5849495"/>
             <a:ext cx="4746172" cy="954107"/>
           </a:xfrm>
           <a:prstGeom prst="rect">
@@ -5445,7 +5502,7 @@
                 <a:latin typeface="Poppins ExtraLight" panose="00000300000000000000" pitchFamily="2" charset="0"/>
                 <a:cs typeface="Poppins ExtraLight" panose="00000300000000000000" pitchFamily="2" charset="0"/>
               </a:rPr>
-              <a:t>:</a:t>
+              <a:t>*:</a:t>
             </a:r>
           </a:p>
           <a:p>
@@ -5469,14 +5526,14 @@
           <p:nvPr>
             <p:extLst>
               <p:ext uri="{D42A27DB-BD31-4B8C-83A1-F6EECF244321}">
-                <p14:modId xmlns:p14="http://schemas.microsoft.com/office/powerpoint/2010/main" val="3062604775"/>
+                <p14:modId xmlns:p14="http://schemas.microsoft.com/office/powerpoint/2010/main" val="4292936544"/>
               </p:ext>
             </p:extLst>
           </p:nvPr>
         </p:nvGraphicFramePr>
         <p:xfrm>
-          <a:off x="6096000" y="2249994"/>
-          <a:ext cx="5728240" cy="3458392"/>
+          <a:off x="6360065" y="2480825"/>
+          <a:ext cx="5968385" cy="3112968"/>
         </p:xfrm>
         <a:graphic>
           <a:graphicData uri="http://schemas.openxmlformats.org/drawingml/2006/chart">
@@ -5484,6 +5541,93 @@
           </a:graphicData>
         </a:graphic>
       </p:graphicFrame>
+      <p:sp>
+        <p:nvSpPr>
+          <p:cNvPr id="3" name="TextBox 2">
+            <a:extLst>
+              <a:ext uri="{FF2B5EF4-FFF2-40B4-BE49-F238E27FC236}">
+                <a16:creationId xmlns:a16="http://schemas.microsoft.com/office/drawing/2014/main" id="{014C1452-1685-4408-BE52-54F561021EE2}"/>
+              </a:ext>
+            </a:extLst>
+          </p:cNvPr>
+          <p:cNvSpPr txBox="1"/>
+          <p:nvPr/>
+        </p:nvSpPr>
+        <p:spPr>
+          <a:xfrm>
+            <a:off x="6548545" y="5486071"/>
+            <a:ext cx="5426172" cy="338554"/>
+          </a:xfrm>
+          <a:prstGeom prst="rect">
+            <a:avLst/>
+          </a:prstGeom>
+          <a:noFill/>
+        </p:spPr>
+        <p:txBody>
+          <a:bodyPr wrap="square" rtlCol="0">
+            <a:spAutoFit/>
+          </a:bodyPr>
+          <a:lstStyle/>
+          <a:p>
+            <a:r>
+              <a:rPr lang="en-US" sz="800" dirty="0">
+                <a:latin typeface="Poppins ExtraLight" panose="00000300000000000000" pitchFamily="2" charset="0"/>
+                <a:cs typeface="Poppins ExtraLight" panose="00000300000000000000" pitchFamily="2" charset="0"/>
+              </a:rPr>
+              <a:t>* </a:t>
+            </a:r>
+            <a:r>
+              <a:rPr lang="en-US" sz="800" dirty="0" err="1">
+                <a:latin typeface="Poppins ExtraLight" panose="00000300000000000000" pitchFamily="2" charset="0"/>
+                <a:cs typeface="Poppins ExtraLight" panose="00000300000000000000" pitchFamily="2" charset="0"/>
+              </a:rPr>
+              <a:t>Rezultati</a:t>
+            </a:r>
+            <a:r>
+              <a:rPr lang="en-US" sz="800" dirty="0">
+                <a:latin typeface="Poppins ExtraLight" panose="00000300000000000000" pitchFamily="2" charset="0"/>
+                <a:cs typeface="Poppins ExtraLight" panose="00000300000000000000" pitchFamily="2" charset="0"/>
+              </a:rPr>
+              <a:t> </a:t>
+            </a:r>
+            <a:r>
+              <a:rPr lang="en-US" sz="800" dirty="0" err="1">
+                <a:latin typeface="Poppins ExtraLight" panose="00000300000000000000" pitchFamily="2" charset="0"/>
+                <a:cs typeface="Poppins ExtraLight" panose="00000300000000000000" pitchFamily="2" charset="0"/>
+              </a:rPr>
+              <a:t>su</a:t>
+            </a:r>
+            <a:r>
+              <a:rPr lang="en-US" sz="800" dirty="0">
+                <a:latin typeface="Poppins ExtraLight" panose="00000300000000000000" pitchFamily="2" charset="0"/>
+                <a:cs typeface="Poppins ExtraLight" panose="00000300000000000000" pitchFamily="2" charset="0"/>
+              </a:rPr>
+              <a:t> </a:t>
+            </a:r>
+            <a:r>
+              <a:rPr lang="en-US" sz="800" dirty="0" err="1">
+                <a:latin typeface="Poppins ExtraLight" panose="00000300000000000000" pitchFamily="2" charset="0"/>
+                <a:cs typeface="Poppins ExtraLight" panose="00000300000000000000" pitchFamily="2" charset="0"/>
+              </a:rPr>
+              <a:t>dobijeni</a:t>
+            </a:r>
+            <a:r>
+              <a:rPr lang="en-US" sz="800" dirty="0">
+                <a:latin typeface="Poppins ExtraLight" panose="00000300000000000000" pitchFamily="2" charset="0"/>
+                <a:cs typeface="Poppins ExtraLight" panose="00000300000000000000" pitchFamily="2" charset="0"/>
+              </a:rPr>
+              <a:t> ra</a:t>
+            </a:r>
+            <a:r>
+              <a:rPr lang="sr-Latn-RS" sz="800" dirty="0">
+                <a:latin typeface="Poppins ExtraLight" panose="00000300000000000000" pitchFamily="2" charset="0"/>
+                <a:cs typeface="Poppins ExtraLight" panose="00000300000000000000" pitchFamily="2" charset="0"/>
+              </a:rPr>
+              <a:t>čunanjem prosečnog vremena potrebnog za naredni potez nakon jedne partije sa svakim od algoritama</a:t>
+            </a:r>
+          </a:p>
+        </p:txBody>
+      </p:sp>
     </p:spTree>
     <p:extLst>
       <p:ext uri="{BB962C8B-B14F-4D97-AF65-F5344CB8AC3E}">

</xml_diff>

<commit_message>
Added monte carlo. Improved poster.
</commit_message>
<xml_diff>
--- a/docs/poster.pptx
+++ b/docs/poster.pptx
@@ -2,7 +2,7 @@
 <file path=ppt/presentation.xml><?xml version="1.0" encoding="utf-8"?>
 <p:presentation xmlns:a="http://schemas.openxmlformats.org/drawingml/2006/main" xmlns:r="http://schemas.openxmlformats.org/officeDocument/2006/relationships" xmlns:p="http://schemas.openxmlformats.org/presentationml/2006/main" saveSubsetFonts="1">
   <p:sldMasterIdLst>
-    <p:sldMasterId id="2147483888" r:id="rId1"/>
+    <p:sldMasterId id="2147484055" r:id="rId1"/>
   </p:sldMasterIdLst>
   <p:sldIdLst>
     <p:sldId id="256" r:id="rId2"/>
@@ -126,7 +126,71 @@
     </mc:Fallback>
   </mc:AlternateContent>
   <c:chart>
-    <c:autoTitleDeleted val="1"/>
+    <c:title>
+      <c:tx>
+        <c:rich>
+          <a:bodyPr rot="0" spcFirstLastPara="1" vertOverflow="ellipsis" vert="horz" wrap="square" anchor="ctr" anchorCtr="1"/>
+          <a:lstStyle/>
+          <a:p>
+            <a:pPr>
+              <a:defRPr sz="2128" b="1" i="0" u="none" strike="noStrike" kern="1200" baseline="0">
+                <a:solidFill>
+                  <a:schemeClr val="tx1">
+                    <a:lumMod val="65000"/>
+                    <a:lumOff val="35000"/>
+                  </a:schemeClr>
+                </a:solidFill>
+                <a:latin typeface="+mn-lt"/>
+                <a:ea typeface="+mn-ea"/>
+                <a:cs typeface="+mn-cs"/>
+              </a:defRPr>
+            </a:pPr>
+            <a:r>
+              <a:rPr lang="en-US" dirty="0"/>
+              <a:t>Pore</a:t>
+            </a:r>
+            <a:r>
+              <a:rPr lang="sr-Latn-RS" dirty="0"/>
+              <a:t>đenje</a:t>
+            </a:r>
+            <a:r>
+              <a:rPr lang="sr-Latn-RS" baseline="0" dirty="0"/>
+              <a:t> vremena odlučivanja</a:t>
+            </a:r>
+            <a:endParaRPr lang="sr-Latn-RS" dirty="0"/>
+          </a:p>
+        </c:rich>
+      </c:tx>
+      <c:overlay val="0"/>
+      <c:spPr>
+        <a:noFill/>
+        <a:ln>
+          <a:noFill/>
+        </a:ln>
+        <a:effectLst/>
+      </c:spPr>
+      <c:txPr>
+        <a:bodyPr rot="0" spcFirstLastPara="1" vertOverflow="ellipsis" vert="horz" wrap="square" anchor="ctr" anchorCtr="1"/>
+        <a:lstStyle/>
+        <a:p>
+          <a:pPr>
+            <a:defRPr sz="2128" b="1" i="0" u="none" strike="noStrike" kern="1200" baseline="0">
+              <a:solidFill>
+                <a:schemeClr val="tx1">
+                  <a:lumMod val="65000"/>
+                  <a:lumOff val="35000"/>
+                </a:schemeClr>
+              </a:solidFill>
+              <a:latin typeface="+mn-lt"/>
+              <a:ea typeface="+mn-ea"/>
+              <a:cs typeface="+mn-cs"/>
+            </a:defRPr>
+          </a:pPr>
+          <a:endParaRPr lang="sr-Latn-RS"/>
+        </a:p>
+      </c:txPr>
+    </c:title>
+    <c:autoTitleDeleted val="0"/>
     <c:plotArea>
       <c:layout>
         <c:manualLayout>
@@ -158,16 +222,77 @@
             </c:strRef>
           </c:tx>
           <c:spPr>
-            <a:solidFill>
-              <a:schemeClr val="accent1"/>
-            </a:solidFill>
+            <a:gradFill rotWithShape="1">
+              <a:gsLst>
+                <a:gs pos="0">
+                  <a:schemeClr val="accent1">
+                    <a:satMod val="103000"/>
+                    <a:lumMod val="102000"/>
+                    <a:tint val="94000"/>
+                  </a:schemeClr>
+                </a:gs>
+                <a:gs pos="50000">
+                  <a:schemeClr val="accent1">
+                    <a:satMod val="110000"/>
+                    <a:lumMod val="100000"/>
+                    <a:shade val="100000"/>
+                  </a:schemeClr>
+                </a:gs>
+                <a:gs pos="100000">
+                  <a:schemeClr val="accent1">
+                    <a:lumMod val="99000"/>
+                    <a:satMod val="120000"/>
+                    <a:shade val="78000"/>
+                  </a:schemeClr>
+                </a:gs>
+              </a:gsLst>
+              <a:lin ang="5400000" scaled="0"/>
+            </a:gradFill>
             <a:ln>
               <a:noFill/>
             </a:ln>
-            <a:effectLst/>
+            <a:effectLst>
+              <a:outerShdw blurRad="57150" dist="19050" dir="5400000" algn="ctr" rotWithShape="0">
+                <a:srgbClr val="000000">
+                  <a:alpha val="63000"/>
+                </a:srgbClr>
+              </a:outerShdw>
+            </a:effectLst>
           </c:spPr>
           <c:invertIfNegative val="0"/>
           <c:dLbls>
+            <c:dLbl>
+              <c:idx val="0"/>
+              <c:tx>
+                <c:rich>
+                  <a:bodyPr/>
+                  <a:lstStyle/>
+                  <a:p>
+                    <a:fld id="{FFC73157-2B90-45C4-A17E-2681A7A088C3}" type="VALUE">
+                      <a:rPr lang="en-US" sz="1050"/>
+                      <a:pPr/>
+                      <a:t>[VALUE]</a:t>
+                    </a:fld>
+                    <a:endParaRPr lang="sr-Latn-RS"/>
+                  </a:p>
+                </c:rich>
+              </c:tx>
+              <c:showLegendKey val="0"/>
+              <c:showVal val="1"/>
+              <c:showCatName val="0"/>
+              <c:showSerName val="0"/>
+              <c:showPercent val="0"/>
+              <c:showBubbleSize val="0"/>
+              <c:extLst>
+                <c:ext xmlns:c15="http://schemas.microsoft.com/office/drawing/2012/chart" uri="{CE6537A1-D6FC-4f65-9D91-7224C49458BB}">
+                  <c15:dlblFieldTable/>
+                  <c15:showDataLabelsRange val="0"/>
+                </c:ext>
+                <c:ext xmlns:c16="http://schemas.microsoft.com/office/drawing/2014/chart" uri="{C3380CC4-5D6E-409C-BE32-E72D297353CC}">
+                  <c16:uniqueId val="{00000005-F2B7-495C-8F8D-1760FB1D8425}"/>
+                </c:ext>
+              </c:extLst>
+            </c:dLbl>
             <c:spPr>
               <a:noFill/>
               <a:ln>
@@ -268,16 +393,77 @@
             </c:strRef>
           </c:tx>
           <c:spPr>
-            <a:solidFill>
-              <a:schemeClr val="accent2"/>
-            </a:solidFill>
+            <a:gradFill rotWithShape="1">
+              <a:gsLst>
+                <a:gs pos="0">
+                  <a:schemeClr val="accent2">
+                    <a:satMod val="103000"/>
+                    <a:lumMod val="102000"/>
+                    <a:tint val="94000"/>
+                  </a:schemeClr>
+                </a:gs>
+                <a:gs pos="50000">
+                  <a:schemeClr val="accent2">
+                    <a:satMod val="110000"/>
+                    <a:lumMod val="100000"/>
+                    <a:shade val="100000"/>
+                  </a:schemeClr>
+                </a:gs>
+                <a:gs pos="100000">
+                  <a:schemeClr val="accent2">
+                    <a:lumMod val="99000"/>
+                    <a:satMod val="120000"/>
+                    <a:shade val="78000"/>
+                  </a:schemeClr>
+                </a:gs>
+              </a:gsLst>
+              <a:lin ang="5400000" scaled="0"/>
+            </a:gradFill>
             <a:ln>
               <a:noFill/>
             </a:ln>
-            <a:effectLst/>
+            <a:effectLst>
+              <a:outerShdw blurRad="57150" dist="19050" dir="5400000" algn="ctr" rotWithShape="0">
+                <a:srgbClr val="000000">
+                  <a:alpha val="63000"/>
+                </a:srgbClr>
+              </a:outerShdw>
+            </a:effectLst>
           </c:spPr>
           <c:invertIfNegative val="0"/>
           <c:dLbls>
+            <c:dLbl>
+              <c:idx val="0"/>
+              <c:tx>
+                <c:rich>
+                  <a:bodyPr/>
+                  <a:lstStyle/>
+                  <a:p>
+                    <a:fld id="{43245012-762B-4374-BE22-4F4E71EFB0EB}" type="VALUE">
+                      <a:rPr lang="en-US" sz="1050"/>
+                      <a:pPr/>
+                      <a:t>[VALUE]</a:t>
+                    </a:fld>
+                    <a:endParaRPr lang="sr-Latn-RS"/>
+                  </a:p>
+                </c:rich>
+              </c:tx>
+              <c:showLegendKey val="0"/>
+              <c:showVal val="1"/>
+              <c:showCatName val="0"/>
+              <c:showSerName val="0"/>
+              <c:showPercent val="0"/>
+              <c:showBubbleSize val="0"/>
+              <c:extLst>
+                <c:ext xmlns:c15="http://schemas.microsoft.com/office/drawing/2012/chart" uri="{CE6537A1-D6FC-4f65-9D91-7224C49458BB}">
+                  <c15:dlblFieldTable/>
+                  <c15:showDataLabelsRange val="0"/>
+                </c:ext>
+                <c:ext xmlns:c16="http://schemas.microsoft.com/office/drawing/2014/chart" uri="{C3380CC4-5D6E-409C-BE32-E72D297353CC}">
+                  <c16:uniqueId val="{00000004-F2B7-495C-8F8D-1760FB1D8425}"/>
+                </c:ext>
+              </c:extLst>
+            </c:dLbl>
             <c:spPr>
               <a:noFill/>
               <a:ln>
@@ -378,16 +564,77 @@
             </c:strRef>
           </c:tx>
           <c:spPr>
-            <a:solidFill>
-              <a:schemeClr val="accent3"/>
-            </a:solidFill>
+            <a:gradFill rotWithShape="1">
+              <a:gsLst>
+                <a:gs pos="0">
+                  <a:schemeClr val="accent3">
+                    <a:satMod val="103000"/>
+                    <a:lumMod val="102000"/>
+                    <a:tint val="94000"/>
+                  </a:schemeClr>
+                </a:gs>
+                <a:gs pos="50000">
+                  <a:schemeClr val="accent3">
+                    <a:satMod val="110000"/>
+                    <a:lumMod val="100000"/>
+                    <a:shade val="100000"/>
+                  </a:schemeClr>
+                </a:gs>
+                <a:gs pos="100000">
+                  <a:schemeClr val="accent3">
+                    <a:lumMod val="99000"/>
+                    <a:satMod val="120000"/>
+                    <a:shade val="78000"/>
+                  </a:schemeClr>
+                </a:gs>
+              </a:gsLst>
+              <a:lin ang="5400000" scaled="0"/>
+            </a:gradFill>
             <a:ln>
               <a:noFill/>
             </a:ln>
-            <a:effectLst/>
+            <a:effectLst>
+              <a:outerShdw blurRad="57150" dist="19050" dir="5400000" algn="ctr" rotWithShape="0">
+                <a:srgbClr val="000000">
+                  <a:alpha val="63000"/>
+                </a:srgbClr>
+              </a:outerShdw>
+            </a:effectLst>
           </c:spPr>
           <c:invertIfNegative val="0"/>
           <c:dLbls>
+            <c:dLbl>
+              <c:idx val="0"/>
+              <c:tx>
+                <c:rich>
+                  <a:bodyPr/>
+                  <a:lstStyle/>
+                  <a:p>
+                    <a:fld id="{6615C15D-76EB-47F0-9A82-3C7117DBFEB6}" type="VALUE">
+                      <a:rPr lang="en-US" sz="1050"/>
+                      <a:pPr/>
+                      <a:t>[VALUE]</a:t>
+                    </a:fld>
+                    <a:endParaRPr lang="sr-Latn-RS"/>
+                  </a:p>
+                </c:rich>
+              </c:tx>
+              <c:showLegendKey val="0"/>
+              <c:showVal val="1"/>
+              <c:showCatName val="0"/>
+              <c:showSerName val="0"/>
+              <c:showPercent val="0"/>
+              <c:showBubbleSize val="0"/>
+              <c:extLst>
+                <c:ext xmlns:c15="http://schemas.microsoft.com/office/drawing/2012/chart" uri="{CE6537A1-D6FC-4f65-9D91-7224C49458BB}">
+                  <c15:dlblFieldTable/>
+                  <c15:showDataLabelsRange val="0"/>
+                </c:ext>
+                <c:ext xmlns:c16="http://schemas.microsoft.com/office/drawing/2014/chart" uri="{C3380CC4-5D6E-409C-BE32-E72D297353CC}">
+                  <c16:uniqueId val="{00000003-F2B7-495C-8F8D-1760FB1D8425}"/>
+                </c:ext>
+              </c:extLst>
+            </c:dLbl>
             <c:spPr>
               <a:noFill/>
               <a:ln>
@@ -473,6 +720,177 @@
             </c:ext>
           </c:extLst>
         </c:ser>
+        <c:ser>
+          <c:idx val="3"/>
+          <c:order val="3"/>
+          <c:tx>
+            <c:strRef>
+              <c:f>Sheet1!$E$1</c:f>
+              <c:strCache>
+                <c:ptCount val="1"/>
+                <c:pt idx="0">
+                  <c:v>Monte Karlo</c:v>
+                </c:pt>
+              </c:strCache>
+            </c:strRef>
+          </c:tx>
+          <c:spPr>
+            <a:gradFill rotWithShape="1">
+              <a:gsLst>
+                <a:gs pos="0">
+                  <a:schemeClr val="accent4">
+                    <a:satMod val="103000"/>
+                    <a:lumMod val="102000"/>
+                    <a:tint val="94000"/>
+                  </a:schemeClr>
+                </a:gs>
+                <a:gs pos="50000">
+                  <a:schemeClr val="accent4">
+                    <a:satMod val="110000"/>
+                    <a:lumMod val="100000"/>
+                    <a:shade val="100000"/>
+                  </a:schemeClr>
+                </a:gs>
+                <a:gs pos="100000">
+                  <a:schemeClr val="accent4">
+                    <a:lumMod val="99000"/>
+                    <a:satMod val="120000"/>
+                    <a:shade val="78000"/>
+                  </a:schemeClr>
+                </a:gs>
+              </a:gsLst>
+              <a:lin ang="5400000" scaled="0"/>
+            </a:gradFill>
+            <a:ln>
+              <a:noFill/>
+            </a:ln>
+            <a:effectLst>
+              <a:outerShdw blurRad="57150" dist="19050" dir="5400000" algn="ctr" rotWithShape="0">
+                <a:srgbClr val="000000">
+                  <a:alpha val="63000"/>
+                </a:srgbClr>
+              </a:outerShdw>
+            </a:effectLst>
+          </c:spPr>
+          <c:invertIfNegative val="0"/>
+          <c:dLbls>
+            <c:dLbl>
+              <c:idx val="0"/>
+              <c:tx>
+                <c:rich>
+                  <a:bodyPr/>
+                  <a:lstStyle/>
+                  <a:p>
+                    <a:fld id="{BB3F8695-FE5E-4D3A-A95F-54FA4811FCD6}" type="VALUE">
+                      <a:rPr lang="en-US" sz="1050"/>
+                      <a:pPr/>
+                      <a:t>[VALUE]</a:t>
+                    </a:fld>
+                    <a:endParaRPr lang="sr-Latn-RS"/>
+                  </a:p>
+                </c:rich>
+              </c:tx>
+              <c:showLegendKey val="0"/>
+              <c:showVal val="1"/>
+              <c:showCatName val="0"/>
+              <c:showSerName val="0"/>
+              <c:showPercent val="0"/>
+              <c:showBubbleSize val="0"/>
+              <c:extLst>
+                <c:ext xmlns:c15="http://schemas.microsoft.com/office/drawing/2012/chart" uri="{CE6537A1-D6FC-4f65-9D91-7224C49458BB}">
+                  <c15:dlblFieldTable/>
+                  <c15:showDataLabelsRange val="0"/>
+                </c:ext>
+                <c:ext xmlns:c16="http://schemas.microsoft.com/office/drawing/2014/chart" uri="{C3380CC4-5D6E-409C-BE32-E72D297353CC}">
+                  <c16:uniqueId val="{00000002-F2B7-495C-8F8D-1760FB1D8425}"/>
+                </c:ext>
+              </c:extLst>
+            </c:dLbl>
+            <c:spPr>
+              <a:noFill/>
+              <a:ln>
+                <a:noFill/>
+              </a:ln>
+              <a:effectLst/>
+            </c:spPr>
+            <c:txPr>
+              <a:bodyPr rot="0" spcFirstLastPara="1" vertOverflow="ellipsis" vert="horz" wrap="square" lIns="38100" tIns="19050" rIns="38100" bIns="19050" anchor="ctr" anchorCtr="1">
+                <a:spAutoFit/>
+              </a:bodyPr>
+              <a:lstStyle/>
+              <a:p>
+                <a:pPr>
+                  <a:defRPr sz="1197" b="0" i="0" u="none" strike="noStrike" kern="1200" baseline="0">
+                    <a:solidFill>
+                      <a:schemeClr val="tx1">
+                        <a:lumMod val="75000"/>
+                        <a:lumOff val="25000"/>
+                      </a:schemeClr>
+                    </a:solidFill>
+                    <a:latin typeface="+mn-lt"/>
+                    <a:ea typeface="+mn-ea"/>
+                    <a:cs typeface="+mn-cs"/>
+                  </a:defRPr>
+                </a:pPr>
+                <a:endParaRPr lang="sr-Latn-RS"/>
+              </a:p>
+            </c:txPr>
+            <c:showLegendKey val="0"/>
+            <c:showVal val="1"/>
+            <c:showCatName val="0"/>
+            <c:showSerName val="0"/>
+            <c:showPercent val="0"/>
+            <c:showBubbleSize val="0"/>
+            <c:showLeaderLines val="0"/>
+            <c:extLst>
+              <c:ext xmlns:c15="http://schemas.microsoft.com/office/drawing/2012/chart" uri="{CE6537A1-D6FC-4f65-9D91-7224C49458BB}">
+                <c15:showLeaderLines val="1"/>
+                <c15:leaderLines>
+                  <c:spPr>
+                    <a:ln w="9525" cap="flat" cmpd="sng" algn="ctr">
+                      <a:solidFill>
+                        <a:schemeClr val="tx1">
+                          <a:lumMod val="35000"/>
+                          <a:lumOff val="65000"/>
+                        </a:schemeClr>
+                      </a:solidFill>
+                      <a:round/>
+                    </a:ln>
+                    <a:effectLst/>
+                  </c:spPr>
+                </c15:leaderLines>
+              </c:ext>
+            </c:extLst>
+          </c:dLbls>
+          <c:cat>
+            <c:strRef>
+              <c:f>Sheet1!$A$2:$A$5</c:f>
+              <c:strCache>
+                <c:ptCount val="1"/>
+                <c:pt idx="0">
+                  <c:v>Vreme (s)</c:v>
+                </c:pt>
+              </c:strCache>
+            </c:strRef>
+          </c:cat>
+          <c:val>
+            <c:numRef>
+              <c:f>Sheet1!$E$2:$E$5</c:f>
+              <c:numCache>
+                <c:formatCode>General</c:formatCode>
+                <c:ptCount val="4"/>
+                <c:pt idx="0" formatCode="0.00">
+                  <c:v>2.04</c:v>
+                </c:pt>
+              </c:numCache>
+            </c:numRef>
+          </c:val>
+          <c:extLst>
+            <c:ext xmlns:c16="http://schemas.microsoft.com/office/drawing/2014/chart" uri="{C3380CC4-5D6E-409C-BE32-E72D297353CC}">
+              <c16:uniqueId val="{00000001-F2B7-495C-8F8D-1760FB1D8425}"/>
+            </c:ext>
+          </c:extLst>
+        </c:ser>
         <c:dLbls>
           <c:showLegendKey val="0"/>
           <c:showVal val="0"/>
@@ -481,7 +899,8 @@
           <c:showPercent val="0"/>
           <c:showBubbleSize val="0"/>
         </c:dLbls>
-        <c:gapWidth val="182"/>
+        <c:gapWidth val="115"/>
+        <c:overlap val="-20"/>
         <c:axId val="1207111744"/>
         <c:axId val="1207108832"/>
       </c:barChart>
@@ -498,7 +917,7 @@
         <c:tickLblPos val="nextTo"/>
         <c:spPr>
           <a:noFill/>
-          <a:ln w="9525" cap="flat" cmpd="sng" algn="ctr">
+          <a:ln w="12700" cap="flat" cmpd="sng" algn="ctr">
             <a:solidFill>
               <a:schemeClr val="tx1">
                 <a:lumMod val="15000"/>
@@ -706,7 +1125,7 @@
 </file>
 
 <file path=ppt/charts/style1.xml><?xml version="1.0" encoding="utf-8"?>
-<cs:chartStyle xmlns:cs="http://schemas.microsoft.com/office/drawing/2012/chartStyle" xmlns:a="http://schemas.openxmlformats.org/drawingml/2006/main" id="216">
+<cs:chartStyle xmlns:cs="http://schemas.microsoft.com/office/drawing/2012/chartStyle" xmlns:a="http://schemas.openxmlformats.org/drawingml/2006/main" id="341">
   <cs:axisTitle>
     <cs:lnRef idx="0"/>
     <cs:fillRef idx="0"/>
@@ -717,7 +1136,7 @@
         <a:lumOff val="35000"/>
       </a:schemeClr>
     </cs:fontRef>
-    <cs:defRPr sz="1330" kern="1200"/>
+    <cs:defRPr sz="1197" kern="1200"/>
   </cs:axisTitle>
   <cs:categoryAxis>
     <cs:lnRef idx="0"/>
@@ -730,7 +1149,7 @@
       </a:schemeClr>
     </cs:fontRef>
     <cs:spPr>
-      <a:ln w="9525" cap="flat" cmpd="sng" algn="ctr">
+      <a:ln w="12700" cap="flat" cmpd="sng" algn="ctr">
         <a:solidFill>
           <a:schemeClr val="tx1">
             <a:lumMod val="15000"/>
@@ -747,7 +1166,7 @@
     <cs:fillRef idx="0"/>
     <cs:effectRef idx="0"/>
     <cs:fontRef idx="minor">
-      <a:schemeClr val="tx1"/>
+      <a:schemeClr val="tx2"/>
     </cs:fontRef>
     <cs:spPr>
       <a:solidFill>
@@ -763,7 +1182,7 @@
         <a:round/>
       </a:ln>
     </cs:spPr>
-    <cs:defRPr sz="1330" kern="1200"/>
+    <cs:defRPr sz="1197" kern="1200"/>
   </cs:chartArea>
   <cs:dataLabel>
     <cs:lnRef idx="0"/>
@@ -807,20 +1226,20 @@
   </cs:dataLabelCallout>
   <cs:dataPoint>
     <cs:lnRef idx="0"/>
-    <cs:fillRef idx="1">
+    <cs:fillRef idx="3">
       <cs:styleClr val="auto"/>
     </cs:fillRef>
-    <cs:effectRef idx="0"/>
+    <cs:effectRef idx="3"/>
     <cs:fontRef idx="minor">
       <a:schemeClr val="tx1"/>
     </cs:fontRef>
   </cs:dataPoint>
   <cs:dataPoint3D>
     <cs:lnRef idx="0"/>
-    <cs:fillRef idx="1">
+    <cs:fillRef idx="3">
       <cs:styleClr val="auto"/>
     </cs:fillRef>
-    <cs:effectRef idx="0"/>
+    <cs:effectRef idx="3"/>
     <cs:fontRef idx="minor">
       <a:schemeClr val="tx1"/>
     </cs:fontRef>
@@ -829,13 +1248,13 @@
     <cs:lnRef idx="0">
       <cs:styleClr val="auto"/>
     </cs:lnRef>
-    <cs:fillRef idx="1"/>
-    <cs:effectRef idx="0"/>
+    <cs:fillRef idx="3"/>
+    <cs:effectRef idx="3"/>
     <cs:fontRef idx="minor">
       <a:schemeClr val="tx1"/>
     </cs:fontRef>
     <cs:spPr>
-      <a:ln w="28575" cap="rnd">
+      <a:ln w="34925" cap="rnd">
         <a:solidFill>
           <a:schemeClr val="phClr"/>
         </a:solidFill>
@@ -847,10 +1266,10 @@
     <cs:lnRef idx="0">
       <cs:styleClr val="auto"/>
     </cs:lnRef>
-    <cs:fillRef idx="1">
+    <cs:fillRef idx="3">
       <cs:styleClr val="auto"/>
     </cs:fillRef>
-    <cs:effectRef idx="0"/>
+    <cs:effectRef idx="3"/>
     <cs:fontRef idx="minor">
       <a:schemeClr val="tx1"/>
     </cs:fontRef>
@@ -859,16 +1278,17 @@
         <a:solidFill>
           <a:schemeClr val="phClr"/>
         </a:solidFill>
+        <a:round/>
       </a:ln>
     </cs:spPr>
   </cs:dataPointMarker>
-  <cs:dataPointMarkerLayout symbol="circle" size="5"/>
+  <cs:dataPointMarkerLayout size="5"/>
   <cs:dataPointWireframe>
     <cs:lnRef idx="0">
       <cs:styleClr val="auto"/>
     </cs:lnRef>
-    <cs:fillRef idx="1"/>
-    <cs:effectRef idx="0"/>
+    <cs:fillRef idx="3"/>
+    <cs:effectRef idx="3"/>
     <cs:fontRef idx="minor">
       <a:schemeClr val="tx1"/>
     </cs:fontRef>
@@ -910,23 +1330,22 @@
     <cs:fillRef idx="0"/>
     <cs:effectRef idx="0"/>
     <cs:fontRef idx="minor">
-      <a:schemeClr val="tx1"/>
+      <a:schemeClr val="dk1"/>
     </cs:fontRef>
     <cs:spPr>
       <a:solidFill>
         <a:schemeClr val="dk1">
-          <a:lumMod val="75000"/>
-          <a:lumOff val="25000"/>
+          <a:lumMod val="65000"/>
+          <a:lumOff val="35000"/>
         </a:schemeClr>
       </a:solidFill>
-      <a:ln w="9525" cap="flat" cmpd="sng" algn="ctr">
+      <a:ln w="9525">
         <a:solidFill>
           <a:schemeClr val="tx1">
             <a:lumMod val="65000"/>
             <a:lumOff val="35000"/>
           </a:schemeClr>
         </a:solidFill>
-        <a:round/>
       </a:ln>
     </cs:spPr>
   </cs:downBar>
@@ -973,14 +1392,8 @@
     <cs:fillRef idx="0"/>
     <cs:effectRef idx="0"/>
     <cs:fontRef idx="minor">
-      <a:schemeClr val="tx1"/>
+      <a:schemeClr val="lt1"/>
     </cs:fontRef>
-    <cs:spPr>
-      <a:noFill/>
-      <a:ln>
-        <a:noFill/>
-      </a:ln>
-    </cs:spPr>
   </cs:floor>
   <cs:gridlineMajor>
     <cs:lnRef idx="0"/>
@@ -1031,8 +1444,8 @@
       <a:ln w="9525" cap="flat" cmpd="sng" algn="ctr">
         <a:solidFill>
           <a:schemeClr val="tx1">
-            <a:lumMod val="50000"/>
-            <a:lumOff val="50000"/>
+            <a:lumMod val="75000"/>
+            <a:lumOff val="25000"/>
           </a:schemeClr>
         </a:solidFill>
         <a:round/>
@@ -1070,20 +1483,20 @@
     </cs:fontRef>
     <cs:defRPr sz="1197" kern="1200"/>
   </cs:legend>
-  <cs:plotArea mods="allowNoFillOverride allowNoLineOverride">
+  <cs:plotArea>
     <cs:lnRef idx="0"/>
     <cs:fillRef idx="0"/>
     <cs:effectRef idx="0"/>
     <cs:fontRef idx="minor">
-      <a:schemeClr val="tx1"/>
+      <a:schemeClr val="lt1"/>
     </cs:fontRef>
   </cs:plotArea>
-  <cs:plotArea3D mods="allowNoFillOverride allowNoLineOverride">
+  <cs:plotArea3D>
     <cs:lnRef idx="0"/>
     <cs:fillRef idx="0"/>
     <cs:effectRef idx="0"/>
     <cs:fontRef idx="minor">
-      <a:schemeClr val="tx1"/>
+      <a:schemeClr val="lt1"/>
     </cs:fontRef>
   </cs:plotArea3D>
   <cs:seriesAxis>
@@ -1096,6 +1509,17 @@
         <a:lumOff val="35000"/>
       </a:schemeClr>
     </cs:fontRef>
+    <cs:spPr>
+      <a:ln w="12700" cap="flat" cmpd="sng" algn="ctr">
+        <a:solidFill>
+          <a:schemeClr val="tx1">
+            <a:lumMod val="15000"/>
+            <a:lumOff val="85000"/>
+          </a:schemeClr>
+        </a:solidFill>
+        <a:round/>
+      </a:ln>
+    </cs:spPr>
     <cs:defRPr sz="1197" kern="1200"/>
   </cs:seriesAxis>
   <cs:seriesLine>
@@ -1127,7 +1551,7 @@
         <a:lumOff val="35000"/>
       </a:schemeClr>
     </cs:fontRef>
-    <cs:defRPr sz="1862" b="0" kern="1200" spc="0" baseline="0"/>
+    <cs:defRPr sz="2128" b="1" kern="1200" baseline="0"/>
   </cs:title>
   <cs:trendline>
     <cs:lnRef idx="0">
@@ -1136,14 +1560,13 @@
     <cs:fillRef idx="0"/>
     <cs:effectRef idx="0"/>
     <cs:fontRef idx="minor">
-      <a:schemeClr val="tx1"/>
+      <a:schemeClr val="lt1"/>
     </cs:fontRef>
     <cs:spPr>
       <a:ln w="19050" cap="rnd">
         <a:solidFill>
           <a:schemeClr val="phClr"/>
         </a:solidFill>
-        <a:prstDash val="sysDot"/>
       </a:ln>
     </cs:spPr>
   </cs:trendline>
@@ -1164,20 +1587,19 @@
     <cs:fillRef idx="0"/>
     <cs:effectRef idx="0"/>
     <cs:fontRef idx="minor">
-      <a:schemeClr val="tx1"/>
+      <a:schemeClr val="dk1"/>
     </cs:fontRef>
     <cs:spPr>
       <a:solidFill>
         <a:schemeClr val="lt1"/>
       </a:solidFill>
-      <a:ln w="9525" cap="flat" cmpd="sng" algn="ctr">
+      <a:ln w="9525">
         <a:solidFill>
           <a:schemeClr val="tx1">
-            <a:lumMod val="65000"/>
-            <a:lumOff val="35000"/>
+            <a:lumMod val="15000"/>
+            <a:lumOff val="85000"/>
           </a:schemeClr>
         </a:solidFill>
-        <a:round/>
       </a:ln>
     </cs:spPr>
   </cs:upBar>
@@ -1198,14 +1620,8 @@
     <cs:fillRef idx="0"/>
     <cs:effectRef idx="0"/>
     <cs:fontRef idx="minor">
-      <a:schemeClr val="tx1"/>
+      <a:schemeClr val="lt1"/>
     </cs:fontRef>
-    <cs:spPr>
-      <a:noFill/>
-      <a:ln>
-        <a:noFill/>
-      </a:ln>
-    </cs:spPr>
   </cs:wall>
 </cs:chartStyle>
 </file>
@@ -1232,7 +1648,7 @@
           <p:cNvPr id="2" name="Title 1">
             <a:extLst>
               <a:ext uri="{FF2B5EF4-FFF2-40B4-BE49-F238E27FC236}">
-                <a16:creationId xmlns:a16="http://schemas.microsoft.com/office/drawing/2014/main" id="{F56B6AB2-D315-4756-AEFB-6A0451CD1AB6}"/>
+                <a16:creationId xmlns:a16="http://schemas.microsoft.com/office/drawing/2014/main" id="{8914635F-FA64-4D04-AA6E-417538F124B4}"/>
               </a:ext>
             </a:extLst>
           </p:cNvPr>
@@ -1270,7 +1686,7 @@
           <p:cNvPr id="3" name="Subtitle 2">
             <a:extLst>
               <a:ext uri="{FF2B5EF4-FFF2-40B4-BE49-F238E27FC236}">
-                <a16:creationId xmlns:a16="http://schemas.microsoft.com/office/drawing/2014/main" id="{7B94E948-B5B6-44DE-911A-CD1151C91D70}"/>
+                <a16:creationId xmlns:a16="http://schemas.microsoft.com/office/drawing/2014/main" id="{B9428AE4-39DF-4155-9ECE-C817B9FC278F}"/>
               </a:ext>
             </a:extLst>
           </p:cNvPr>
@@ -1341,7 +1757,7 @@
           <p:cNvPr id="4" name="Date Placeholder 3">
             <a:extLst>
               <a:ext uri="{FF2B5EF4-FFF2-40B4-BE49-F238E27FC236}">
-                <a16:creationId xmlns:a16="http://schemas.microsoft.com/office/drawing/2014/main" id="{8FF36E4A-CFDF-40EA-884A-55939286131A}"/>
+                <a16:creationId xmlns:a16="http://schemas.microsoft.com/office/drawing/2014/main" id="{31FC32F5-398F-4C6D-9535-082C532E88D5}"/>
               </a:ext>
             </a:extLst>
           </p:cNvPr>
@@ -1370,7 +1786,7 @@
           <p:cNvPr id="5" name="Footer Placeholder 4">
             <a:extLst>
               <a:ext uri="{FF2B5EF4-FFF2-40B4-BE49-F238E27FC236}">
-                <a16:creationId xmlns:a16="http://schemas.microsoft.com/office/drawing/2014/main" id="{94665C57-2040-4705-8E42-8A4767565641}"/>
+                <a16:creationId xmlns:a16="http://schemas.microsoft.com/office/drawing/2014/main" id="{3A2F6C35-E69E-42AB-B12D-CBDAB4BCB87A}"/>
               </a:ext>
             </a:extLst>
           </p:cNvPr>
@@ -1395,7 +1811,7 @@
           <p:cNvPr id="6" name="Slide Number Placeholder 5">
             <a:extLst>
               <a:ext uri="{FF2B5EF4-FFF2-40B4-BE49-F238E27FC236}">
-                <a16:creationId xmlns:a16="http://schemas.microsoft.com/office/drawing/2014/main" id="{6D37E2E1-9644-4E3A-AA86-BC0BD8767F92}"/>
+                <a16:creationId xmlns:a16="http://schemas.microsoft.com/office/drawing/2014/main" id="{1D79E52D-6603-44C1-B341-FD6D9CB18A38}"/>
               </a:ext>
             </a:extLst>
           </p:cNvPr>
@@ -1422,7 +1838,7 @@
     </p:spTree>
     <p:extLst>
       <p:ext uri="{BB962C8B-B14F-4D97-AF65-F5344CB8AC3E}">
-        <p14:creationId xmlns:p14="http://schemas.microsoft.com/office/powerpoint/2010/main" val="888043991"/>
+        <p14:creationId xmlns:p14="http://schemas.microsoft.com/office/powerpoint/2010/main" val="2838455454"/>
       </p:ext>
     </p:extLst>
   </p:cSld>
@@ -1454,7 +1870,7 @@
           <p:cNvPr id="2" name="Title 1">
             <a:extLst>
               <a:ext uri="{FF2B5EF4-FFF2-40B4-BE49-F238E27FC236}">
-                <a16:creationId xmlns:a16="http://schemas.microsoft.com/office/drawing/2014/main" id="{6436A0E0-5F42-4308-8951-A1C8144E7BA3}"/>
+                <a16:creationId xmlns:a16="http://schemas.microsoft.com/office/drawing/2014/main" id="{06D79CBA-3217-49F7-9927-5F56DDD8D485}"/>
               </a:ext>
             </a:extLst>
           </p:cNvPr>
@@ -1483,7 +1899,7 @@
           <p:cNvPr id="3" name="Vertical Text Placeholder 2">
             <a:extLst>
               <a:ext uri="{FF2B5EF4-FFF2-40B4-BE49-F238E27FC236}">
-                <a16:creationId xmlns:a16="http://schemas.microsoft.com/office/drawing/2014/main" id="{691D7523-820E-4AA7-98C1-0CEEF3C0592E}"/>
+                <a16:creationId xmlns:a16="http://schemas.microsoft.com/office/drawing/2014/main" id="{CB82DE63-67C5-4B6C-B396-6BE0FEE32F90}"/>
               </a:ext>
             </a:extLst>
           </p:cNvPr>
@@ -1541,7 +1957,7 @@
           <p:cNvPr id="4" name="Date Placeholder 3">
             <a:extLst>
               <a:ext uri="{FF2B5EF4-FFF2-40B4-BE49-F238E27FC236}">
-                <a16:creationId xmlns:a16="http://schemas.microsoft.com/office/drawing/2014/main" id="{FBD18949-D55D-41E0-B870-1DC87F8B734F}"/>
+                <a16:creationId xmlns:a16="http://schemas.microsoft.com/office/drawing/2014/main" id="{E7422695-0AF0-436C-AE0B-6077755E3D23}"/>
               </a:ext>
             </a:extLst>
           </p:cNvPr>
@@ -1570,7 +1986,7 @@
           <p:cNvPr id="5" name="Footer Placeholder 4">
             <a:extLst>
               <a:ext uri="{FF2B5EF4-FFF2-40B4-BE49-F238E27FC236}">
-                <a16:creationId xmlns:a16="http://schemas.microsoft.com/office/drawing/2014/main" id="{7B232106-44BD-4151-917C-5C4B53C4F7CC}"/>
+                <a16:creationId xmlns:a16="http://schemas.microsoft.com/office/drawing/2014/main" id="{12A8F8AE-1F10-4B41-AAD0-42DE4653B8BB}"/>
               </a:ext>
             </a:extLst>
           </p:cNvPr>
@@ -1595,7 +2011,7 @@
           <p:cNvPr id="6" name="Slide Number Placeholder 5">
             <a:extLst>
               <a:ext uri="{FF2B5EF4-FFF2-40B4-BE49-F238E27FC236}">
-                <a16:creationId xmlns:a16="http://schemas.microsoft.com/office/drawing/2014/main" id="{F5EA2B96-6009-42E1-B072-666F3AC64BFF}"/>
+                <a16:creationId xmlns:a16="http://schemas.microsoft.com/office/drawing/2014/main" id="{1B7B67F8-C851-4B1C-8F36-51916A85D78D}"/>
               </a:ext>
             </a:extLst>
           </p:cNvPr>
@@ -1622,7 +2038,7 @@
     </p:spTree>
     <p:extLst>
       <p:ext uri="{BB962C8B-B14F-4D97-AF65-F5344CB8AC3E}">
-        <p14:creationId xmlns:p14="http://schemas.microsoft.com/office/powerpoint/2010/main" val="1162980833"/>
+        <p14:creationId xmlns:p14="http://schemas.microsoft.com/office/powerpoint/2010/main" val="1508070294"/>
       </p:ext>
     </p:extLst>
   </p:cSld>
@@ -1654,7 +2070,7 @@
           <p:cNvPr id="2" name="Vertical Title 1">
             <a:extLst>
               <a:ext uri="{FF2B5EF4-FFF2-40B4-BE49-F238E27FC236}">
-                <a16:creationId xmlns:a16="http://schemas.microsoft.com/office/drawing/2014/main" id="{E92FCC08-C483-41A2-8AA6-9D99D890A3FE}"/>
+                <a16:creationId xmlns:a16="http://schemas.microsoft.com/office/drawing/2014/main" id="{4030B055-6E61-4C59-9FF7-F262AAE1AF1A}"/>
               </a:ext>
             </a:extLst>
           </p:cNvPr>
@@ -1688,7 +2104,7 @@
           <p:cNvPr id="3" name="Vertical Text Placeholder 2">
             <a:extLst>
               <a:ext uri="{FF2B5EF4-FFF2-40B4-BE49-F238E27FC236}">
-                <a16:creationId xmlns:a16="http://schemas.microsoft.com/office/drawing/2014/main" id="{0DEDC23D-1462-4145-8F96-B4BF4D1A480D}"/>
+                <a16:creationId xmlns:a16="http://schemas.microsoft.com/office/drawing/2014/main" id="{8A4DFFC4-52AD-4985-8E17-A8F37FC723B2}"/>
               </a:ext>
             </a:extLst>
           </p:cNvPr>
@@ -1751,7 +2167,7 @@
           <p:cNvPr id="4" name="Date Placeholder 3">
             <a:extLst>
               <a:ext uri="{FF2B5EF4-FFF2-40B4-BE49-F238E27FC236}">
-                <a16:creationId xmlns:a16="http://schemas.microsoft.com/office/drawing/2014/main" id="{FA5A6A4B-8D91-429B-BD0B-4B991FD36E17}"/>
+                <a16:creationId xmlns:a16="http://schemas.microsoft.com/office/drawing/2014/main" id="{9C049C75-FE07-483A-9E2E-A0DE220CD923}"/>
               </a:ext>
             </a:extLst>
           </p:cNvPr>
@@ -1780,7 +2196,7 @@
           <p:cNvPr id="5" name="Footer Placeholder 4">
             <a:extLst>
               <a:ext uri="{FF2B5EF4-FFF2-40B4-BE49-F238E27FC236}">
-                <a16:creationId xmlns:a16="http://schemas.microsoft.com/office/drawing/2014/main" id="{D59334E7-4519-4356-A021-8DCB53099383}"/>
+                <a16:creationId xmlns:a16="http://schemas.microsoft.com/office/drawing/2014/main" id="{8FC45517-02B8-46D2-AC2F-C61D35089176}"/>
               </a:ext>
             </a:extLst>
           </p:cNvPr>
@@ -1805,7 +2221,7 @@
           <p:cNvPr id="6" name="Slide Number Placeholder 5">
             <a:extLst>
               <a:ext uri="{FF2B5EF4-FFF2-40B4-BE49-F238E27FC236}">
-                <a16:creationId xmlns:a16="http://schemas.microsoft.com/office/drawing/2014/main" id="{8BA8B6B2-5254-4C0A-96BE-A004D3801A5E}"/>
+                <a16:creationId xmlns:a16="http://schemas.microsoft.com/office/drawing/2014/main" id="{F2D49E34-39DB-476B-AADA-D196E567885A}"/>
               </a:ext>
             </a:extLst>
           </p:cNvPr>
@@ -1832,7 +2248,7 @@
     </p:spTree>
     <p:extLst>
       <p:ext uri="{BB962C8B-B14F-4D97-AF65-F5344CB8AC3E}">
-        <p14:creationId xmlns:p14="http://schemas.microsoft.com/office/powerpoint/2010/main" val="3744410761"/>
+        <p14:creationId xmlns:p14="http://schemas.microsoft.com/office/powerpoint/2010/main" val="852847940"/>
       </p:ext>
     </p:extLst>
   </p:cSld>
@@ -1864,7 +2280,7 @@
           <p:cNvPr id="2" name="Title 1">
             <a:extLst>
               <a:ext uri="{FF2B5EF4-FFF2-40B4-BE49-F238E27FC236}">
-                <a16:creationId xmlns:a16="http://schemas.microsoft.com/office/drawing/2014/main" id="{F5965FBC-E831-4F73-A529-8FC9E4CDA27A}"/>
+                <a16:creationId xmlns:a16="http://schemas.microsoft.com/office/drawing/2014/main" id="{B9B115C3-B931-4780-8A5D-5120C6235963}"/>
               </a:ext>
             </a:extLst>
           </p:cNvPr>
@@ -1893,7 +2309,7 @@
           <p:cNvPr id="3" name="Content Placeholder 2">
             <a:extLst>
               <a:ext uri="{FF2B5EF4-FFF2-40B4-BE49-F238E27FC236}">
-                <a16:creationId xmlns:a16="http://schemas.microsoft.com/office/drawing/2014/main" id="{6BB7AF13-9798-4FCF-96FB-A7D67CCC92F7}"/>
+                <a16:creationId xmlns:a16="http://schemas.microsoft.com/office/drawing/2014/main" id="{74B8A066-B9D5-445F-9806-6CCAF963682F}"/>
               </a:ext>
             </a:extLst>
           </p:cNvPr>
@@ -1951,7 +2367,7 @@
           <p:cNvPr id="4" name="Date Placeholder 3">
             <a:extLst>
               <a:ext uri="{FF2B5EF4-FFF2-40B4-BE49-F238E27FC236}">
-                <a16:creationId xmlns:a16="http://schemas.microsoft.com/office/drawing/2014/main" id="{2219F86C-E836-45C1-983B-26730EB84197}"/>
+                <a16:creationId xmlns:a16="http://schemas.microsoft.com/office/drawing/2014/main" id="{4773E6E0-95C2-4D0E-B79E-07696032CA3B}"/>
               </a:ext>
             </a:extLst>
           </p:cNvPr>
@@ -1980,7 +2396,7 @@
           <p:cNvPr id="5" name="Footer Placeholder 4">
             <a:extLst>
               <a:ext uri="{FF2B5EF4-FFF2-40B4-BE49-F238E27FC236}">
-                <a16:creationId xmlns:a16="http://schemas.microsoft.com/office/drawing/2014/main" id="{D4DC257D-CF8C-43C1-A08B-4ADA67672062}"/>
+                <a16:creationId xmlns:a16="http://schemas.microsoft.com/office/drawing/2014/main" id="{890588BC-F242-4C06-ACC7-05499348C512}"/>
               </a:ext>
             </a:extLst>
           </p:cNvPr>
@@ -2005,7 +2421,7 @@
           <p:cNvPr id="6" name="Slide Number Placeholder 5">
             <a:extLst>
               <a:ext uri="{FF2B5EF4-FFF2-40B4-BE49-F238E27FC236}">
-                <a16:creationId xmlns:a16="http://schemas.microsoft.com/office/drawing/2014/main" id="{F3B3FBE9-C7EC-459B-8618-A8D461FB4FF2}"/>
+                <a16:creationId xmlns:a16="http://schemas.microsoft.com/office/drawing/2014/main" id="{77A3129E-78A3-465C-9DF3-5FA77C84566E}"/>
               </a:ext>
             </a:extLst>
           </p:cNvPr>
@@ -2032,7 +2448,7 @@
     </p:spTree>
     <p:extLst>
       <p:ext uri="{BB962C8B-B14F-4D97-AF65-F5344CB8AC3E}">
-        <p14:creationId xmlns:p14="http://schemas.microsoft.com/office/powerpoint/2010/main" val="3862258113"/>
+        <p14:creationId xmlns:p14="http://schemas.microsoft.com/office/powerpoint/2010/main" val="770024208"/>
       </p:ext>
     </p:extLst>
   </p:cSld>
@@ -2064,7 +2480,7 @@
           <p:cNvPr id="2" name="Title 1">
             <a:extLst>
               <a:ext uri="{FF2B5EF4-FFF2-40B4-BE49-F238E27FC236}">
-                <a16:creationId xmlns:a16="http://schemas.microsoft.com/office/drawing/2014/main" id="{1C47F4D1-2C91-40EF-8785-6EA21C489BFC}"/>
+                <a16:creationId xmlns:a16="http://schemas.microsoft.com/office/drawing/2014/main" id="{1059F6C4-945F-4FCA-AA9D-173CE86592CB}"/>
               </a:ext>
             </a:extLst>
           </p:cNvPr>
@@ -2102,7 +2518,7 @@
           <p:cNvPr id="3" name="Text Placeholder 2">
             <a:extLst>
               <a:ext uri="{FF2B5EF4-FFF2-40B4-BE49-F238E27FC236}">
-                <a16:creationId xmlns:a16="http://schemas.microsoft.com/office/drawing/2014/main" id="{175C52C5-BDFB-4EAD-85E9-964411121522}"/>
+                <a16:creationId xmlns:a16="http://schemas.microsoft.com/office/drawing/2014/main" id="{844147EE-D58D-4A62-8193-84493C05F1F1}"/>
               </a:ext>
             </a:extLst>
           </p:cNvPr>
@@ -2227,7 +2643,7 @@
           <p:cNvPr id="4" name="Date Placeholder 3">
             <a:extLst>
               <a:ext uri="{FF2B5EF4-FFF2-40B4-BE49-F238E27FC236}">
-                <a16:creationId xmlns:a16="http://schemas.microsoft.com/office/drawing/2014/main" id="{1457324E-BE86-490B-B673-58696195F23D}"/>
+                <a16:creationId xmlns:a16="http://schemas.microsoft.com/office/drawing/2014/main" id="{6A56BAAE-0C4E-47C5-B658-0A01DC86E2FA}"/>
               </a:ext>
             </a:extLst>
           </p:cNvPr>
@@ -2256,7 +2672,7 @@
           <p:cNvPr id="5" name="Footer Placeholder 4">
             <a:extLst>
               <a:ext uri="{FF2B5EF4-FFF2-40B4-BE49-F238E27FC236}">
-                <a16:creationId xmlns:a16="http://schemas.microsoft.com/office/drawing/2014/main" id="{6695327C-B7A4-4FF7-9841-ED5BDB54CA11}"/>
+                <a16:creationId xmlns:a16="http://schemas.microsoft.com/office/drawing/2014/main" id="{91923C39-E4C5-4437-BEE6-81FAC0A6A5D7}"/>
               </a:ext>
             </a:extLst>
           </p:cNvPr>
@@ -2281,7 +2697,7 @@
           <p:cNvPr id="6" name="Slide Number Placeholder 5">
             <a:extLst>
               <a:ext uri="{FF2B5EF4-FFF2-40B4-BE49-F238E27FC236}">
-                <a16:creationId xmlns:a16="http://schemas.microsoft.com/office/drawing/2014/main" id="{EDF82FE0-121A-4C52-9F63-60CAC0959A36}"/>
+                <a16:creationId xmlns:a16="http://schemas.microsoft.com/office/drawing/2014/main" id="{169701B1-E831-4AB4-A0C9-FE7ED177EA34}"/>
               </a:ext>
             </a:extLst>
           </p:cNvPr>
@@ -2308,7 +2724,7 @@
     </p:spTree>
     <p:extLst>
       <p:ext uri="{BB962C8B-B14F-4D97-AF65-F5344CB8AC3E}">
-        <p14:creationId xmlns:p14="http://schemas.microsoft.com/office/powerpoint/2010/main" val="249152358"/>
+        <p14:creationId xmlns:p14="http://schemas.microsoft.com/office/powerpoint/2010/main" val="534835763"/>
       </p:ext>
     </p:extLst>
   </p:cSld>
@@ -2340,7 +2756,7 @@
           <p:cNvPr id="2" name="Title 1">
             <a:extLst>
               <a:ext uri="{FF2B5EF4-FFF2-40B4-BE49-F238E27FC236}">
-                <a16:creationId xmlns:a16="http://schemas.microsoft.com/office/drawing/2014/main" id="{5070F82E-6CBA-4B8B-ACCF-95C03BC3C3D9}"/>
+                <a16:creationId xmlns:a16="http://schemas.microsoft.com/office/drawing/2014/main" id="{32DB9759-DDB0-464F-8DCA-AF8EA7E101D9}"/>
               </a:ext>
             </a:extLst>
           </p:cNvPr>
@@ -2369,7 +2785,7 @@
           <p:cNvPr id="3" name="Content Placeholder 2">
             <a:extLst>
               <a:ext uri="{FF2B5EF4-FFF2-40B4-BE49-F238E27FC236}">
-                <a16:creationId xmlns:a16="http://schemas.microsoft.com/office/drawing/2014/main" id="{9BFE0295-220C-4C4A-A80C-6DECE5F7BD63}"/>
+                <a16:creationId xmlns:a16="http://schemas.microsoft.com/office/drawing/2014/main" id="{B27A8529-277E-4FE1-9FE9-EF7ED4066D75}"/>
               </a:ext>
             </a:extLst>
           </p:cNvPr>
@@ -2432,7 +2848,7 @@
           <p:cNvPr id="4" name="Content Placeholder 3">
             <a:extLst>
               <a:ext uri="{FF2B5EF4-FFF2-40B4-BE49-F238E27FC236}">
-                <a16:creationId xmlns:a16="http://schemas.microsoft.com/office/drawing/2014/main" id="{045B2BF2-FF86-4CAB-AE9F-3268C1C14132}"/>
+                <a16:creationId xmlns:a16="http://schemas.microsoft.com/office/drawing/2014/main" id="{91F9AB6C-6489-4B14-8528-9A2808B01759}"/>
               </a:ext>
             </a:extLst>
           </p:cNvPr>
@@ -2495,7 +2911,7 @@
           <p:cNvPr id="5" name="Date Placeholder 4">
             <a:extLst>
               <a:ext uri="{FF2B5EF4-FFF2-40B4-BE49-F238E27FC236}">
-                <a16:creationId xmlns:a16="http://schemas.microsoft.com/office/drawing/2014/main" id="{21DE3551-E161-4E76-A321-04720D11B267}"/>
+                <a16:creationId xmlns:a16="http://schemas.microsoft.com/office/drawing/2014/main" id="{7BE3750A-7B6B-452F-A1B9-EFAB33EE04B2}"/>
               </a:ext>
             </a:extLst>
           </p:cNvPr>
@@ -2524,7 +2940,7 @@
           <p:cNvPr id="6" name="Footer Placeholder 5">
             <a:extLst>
               <a:ext uri="{FF2B5EF4-FFF2-40B4-BE49-F238E27FC236}">
-                <a16:creationId xmlns:a16="http://schemas.microsoft.com/office/drawing/2014/main" id="{626B3677-ED70-427B-982C-DAD505B38D65}"/>
+                <a16:creationId xmlns:a16="http://schemas.microsoft.com/office/drawing/2014/main" id="{20C5FFCF-EB42-40CF-B3A4-2EE40A879D8A}"/>
               </a:ext>
             </a:extLst>
           </p:cNvPr>
@@ -2549,7 +2965,7 @@
           <p:cNvPr id="7" name="Slide Number Placeholder 6">
             <a:extLst>
               <a:ext uri="{FF2B5EF4-FFF2-40B4-BE49-F238E27FC236}">
-                <a16:creationId xmlns:a16="http://schemas.microsoft.com/office/drawing/2014/main" id="{79CB3A19-8A6C-4890-93F2-9794C46D94D6}"/>
+                <a16:creationId xmlns:a16="http://schemas.microsoft.com/office/drawing/2014/main" id="{C9F0BB07-C72D-4734-9037-7C26E043DBD8}"/>
               </a:ext>
             </a:extLst>
           </p:cNvPr>
@@ -2576,7 +2992,7 @@
     </p:spTree>
     <p:extLst>
       <p:ext uri="{BB962C8B-B14F-4D97-AF65-F5344CB8AC3E}">
-        <p14:creationId xmlns:p14="http://schemas.microsoft.com/office/powerpoint/2010/main" val="585494159"/>
+        <p14:creationId xmlns:p14="http://schemas.microsoft.com/office/powerpoint/2010/main" val="1825037421"/>
       </p:ext>
     </p:extLst>
   </p:cSld>
@@ -2608,7 +3024,7 @@
           <p:cNvPr id="2" name="Title 1">
             <a:extLst>
               <a:ext uri="{FF2B5EF4-FFF2-40B4-BE49-F238E27FC236}">
-                <a16:creationId xmlns:a16="http://schemas.microsoft.com/office/drawing/2014/main" id="{2E1EB148-D406-4C9E-BE35-4FE0A2F53B86}"/>
+                <a16:creationId xmlns:a16="http://schemas.microsoft.com/office/drawing/2014/main" id="{F55A68F8-BBD8-4A4D-A797-19B62E58A473}"/>
               </a:ext>
             </a:extLst>
           </p:cNvPr>
@@ -2642,7 +3058,7 @@
           <p:cNvPr id="3" name="Text Placeholder 2">
             <a:extLst>
               <a:ext uri="{FF2B5EF4-FFF2-40B4-BE49-F238E27FC236}">
-                <a16:creationId xmlns:a16="http://schemas.microsoft.com/office/drawing/2014/main" id="{08411341-5588-480D-9D82-960D2C950CF7}"/>
+                <a16:creationId xmlns:a16="http://schemas.microsoft.com/office/drawing/2014/main" id="{72872E2C-711D-42EB-94F5-BCC9094DB915}"/>
               </a:ext>
             </a:extLst>
           </p:cNvPr>
@@ -2713,7 +3129,7 @@
           <p:cNvPr id="4" name="Content Placeholder 3">
             <a:extLst>
               <a:ext uri="{FF2B5EF4-FFF2-40B4-BE49-F238E27FC236}">
-                <a16:creationId xmlns:a16="http://schemas.microsoft.com/office/drawing/2014/main" id="{F43A03EB-C3A9-471D-A58A-3F4CA8840477}"/>
+                <a16:creationId xmlns:a16="http://schemas.microsoft.com/office/drawing/2014/main" id="{83F2A739-2CFC-4CE1-B68F-F41347F2EA20}"/>
               </a:ext>
             </a:extLst>
           </p:cNvPr>
@@ -2776,7 +3192,7 @@
           <p:cNvPr id="5" name="Text Placeholder 4">
             <a:extLst>
               <a:ext uri="{FF2B5EF4-FFF2-40B4-BE49-F238E27FC236}">
-                <a16:creationId xmlns:a16="http://schemas.microsoft.com/office/drawing/2014/main" id="{467E105A-8506-43F8-8D1F-FB1132DA6D23}"/>
+                <a16:creationId xmlns:a16="http://schemas.microsoft.com/office/drawing/2014/main" id="{0F61D68C-9248-4874-9A71-519D9BCF22DB}"/>
               </a:ext>
             </a:extLst>
           </p:cNvPr>
@@ -2847,7 +3263,7 @@
           <p:cNvPr id="6" name="Content Placeholder 5">
             <a:extLst>
               <a:ext uri="{FF2B5EF4-FFF2-40B4-BE49-F238E27FC236}">
-                <a16:creationId xmlns:a16="http://schemas.microsoft.com/office/drawing/2014/main" id="{785357A4-CA6E-4A21-AB3B-578C6FD04E98}"/>
+                <a16:creationId xmlns:a16="http://schemas.microsoft.com/office/drawing/2014/main" id="{47F31929-C8BC-4479-A1B9-CEAB1A7817EA}"/>
               </a:ext>
             </a:extLst>
           </p:cNvPr>
@@ -2910,7 +3326,7 @@
           <p:cNvPr id="7" name="Date Placeholder 6">
             <a:extLst>
               <a:ext uri="{FF2B5EF4-FFF2-40B4-BE49-F238E27FC236}">
-                <a16:creationId xmlns:a16="http://schemas.microsoft.com/office/drawing/2014/main" id="{97CA9729-C797-4651-A129-4453F4AC911E}"/>
+                <a16:creationId xmlns:a16="http://schemas.microsoft.com/office/drawing/2014/main" id="{8CD866CE-57FD-4F44-92E3-4DCA29DF7093}"/>
               </a:ext>
             </a:extLst>
           </p:cNvPr>
@@ -2939,7 +3355,7 @@
           <p:cNvPr id="8" name="Footer Placeholder 7">
             <a:extLst>
               <a:ext uri="{FF2B5EF4-FFF2-40B4-BE49-F238E27FC236}">
-                <a16:creationId xmlns:a16="http://schemas.microsoft.com/office/drawing/2014/main" id="{53943D94-D462-4699-9B40-DDEFEF298343}"/>
+                <a16:creationId xmlns:a16="http://schemas.microsoft.com/office/drawing/2014/main" id="{2346A243-951E-4799-9B7F-6E595D054BA9}"/>
               </a:ext>
             </a:extLst>
           </p:cNvPr>
@@ -2964,7 +3380,7 @@
           <p:cNvPr id="9" name="Slide Number Placeholder 8">
             <a:extLst>
               <a:ext uri="{FF2B5EF4-FFF2-40B4-BE49-F238E27FC236}">
-                <a16:creationId xmlns:a16="http://schemas.microsoft.com/office/drawing/2014/main" id="{65EC1E0F-3C95-448C-B475-26F157791CF1}"/>
+                <a16:creationId xmlns:a16="http://schemas.microsoft.com/office/drawing/2014/main" id="{1FC8641B-C31B-44B5-83D7-91D99B256FD5}"/>
               </a:ext>
             </a:extLst>
           </p:cNvPr>
@@ -2991,7 +3407,7 @@
     </p:spTree>
     <p:extLst>
       <p:ext uri="{BB962C8B-B14F-4D97-AF65-F5344CB8AC3E}">
-        <p14:creationId xmlns:p14="http://schemas.microsoft.com/office/powerpoint/2010/main" val="583819521"/>
+        <p14:creationId xmlns:p14="http://schemas.microsoft.com/office/powerpoint/2010/main" val="295824268"/>
       </p:ext>
     </p:extLst>
   </p:cSld>
@@ -3023,7 +3439,7 @@
           <p:cNvPr id="2" name="Title 1">
             <a:extLst>
               <a:ext uri="{FF2B5EF4-FFF2-40B4-BE49-F238E27FC236}">
-                <a16:creationId xmlns:a16="http://schemas.microsoft.com/office/drawing/2014/main" id="{5C28AED5-DADE-4C0F-9B05-85CD95D95182}"/>
+                <a16:creationId xmlns:a16="http://schemas.microsoft.com/office/drawing/2014/main" id="{4F229B47-FD1F-45C3-A6F8-500B191152E5}"/>
               </a:ext>
             </a:extLst>
           </p:cNvPr>
@@ -3052,7 +3468,7 @@
           <p:cNvPr id="3" name="Date Placeholder 2">
             <a:extLst>
               <a:ext uri="{FF2B5EF4-FFF2-40B4-BE49-F238E27FC236}">
-                <a16:creationId xmlns:a16="http://schemas.microsoft.com/office/drawing/2014/main" id="{49C63306-E81D-4103-918C-9E0A28ED701C}"/>
+                <a16:creationId xmlns:a16="http://schemas.microsoft.com/office/drawing/2014/main" id="{5FC879C0-3BB7-4766-9CF8-8EEEB647E3A3}"/>
               </a:ext>
             </a:extLst>
           </p:cNvPr>
@@ -3081,7 +3497,7 @@
           <p:cNvPr id="4" name="Footer Placeholder 3">
             <a:extLst>
               <a:ext uri="{FF2B5EF4-FFF2-40B4-BE49-F238E27FC236}">
-                <a16:creationId xmlns:a16="http://schemas.microsoft.com/office/drawing/2014/main" id="{47EA42F0-9A9C-4F22-989B-09AD88543637}"/>
+                <a16:creationId xmlns:a16="http://schemas.microsoft.com/office/drawing/2014/main" id="{9D3F9039-ED7A-473C-B2C8-0E1BA4B0B4A0}"/>
               </a:ext>
             </a:extLst>
           </p:cNvPr>
@@ -3106,7 +3522,7 @@
           <p:cNvPr id="5" name="Slide Number Placeholder 4">
             <a:extLst>
               <a:ext uri="{FF2B5EF4-FFF2-40B4-BE49-F238E27FC236}">
-                <a16:creationId xmlns:a16="http://schemas.microsoft.com/office/drawing/2014/main" id="{53CA7729-6CC2-47D6-97E7-9422251AF6D9}"/>
+                <a16:creationId xmlns:a16="http://schemas.microsoft.com/office/drawing/2014/main" id="{1704E43F-9CF5-4121-932F-96A174E32953}"/>
               </a:ext>
             </a:extLst>
           </p:cNvPr>
@@ -3133,7 +3549,7 @@
     </p:spTree>
     <p:extLst>
       <p:ext uri="{BB962C8B-B14F-4D97-AF65-F5344CB8AC3E}">
-        <p14:creationId xmlns:p14="http://schemas.microsoft.com/office/powerpoint/2010/main" val="3154316352"/>
+        <p14:creationId xmlns:p14="http://schemas.microsoft.com/office/powerpoint/2010/main" val="2846572310"/>
       </p:ext>
     </p:extLst>
   </p:cSld>
@@ -3165,7 +3581,7 @@
           <p:cNvPr id="2" name="Date Placeholder 1">
             <a:extLst>
               <a:ext uri="{FF2B5EF4-FFF2-40B4-BE49-F238E27FC236}">
-                <a16:creationId xmlns:a16="http://schemas.microsoft.com/office/drawing/2014/main" id="{5C4DE9AE-32B0-44AA-AC92-668D959761E2}"/>
+                <a16:creationId xmlns:a16="http://schemas.microsoft.com/office/drawing/2014/main" id="{86FF21E4-3DF9-4011-8B37-9D0EE68B96E4}"/>
               </a:ext>
             </a:extLst>
           </p:cNvPr>
@@ -3194,7 +3610,7 @@
           <p:cNvPr id="3" name="Footer Placeholder 2">
             <a:extLst>
               <a:ext uri="{FF2B5EF4-FFF2-40B4-BE49-F238E27FC236}">
-                <a16:creationId xmlns:a16="http://schemas.microsoft.com/office/drawing/2014/main" id="{B76960C8-FFFB-4F4F-BA59-A8A2C59985EB}"/>
+                <a16:creationId xmlns:a16="http://schemas.microsoft.com/office/drawing/2014/main" id="{EFC6999B-61A6-45CA-BD03-3E3AA4C0DF88}"/>
               </a:ext>
             </a:extLst>
           </p:cNvPr>
@@ -3219,7 +3635,7 @@
           <p:cNvPr id="4" name="Slide Number Placeholder 3">
             <a:extLst>
               <a:ext uri="{FF2B5EF4-FFF2-40B4-BE49-F238E27FC236}">
-                <a16:creationId xmlns:a16="http://schemas.microsoft.com/office/drawing/2014/main" id="{41967B41-8CC6-4D35-9B18-D884ABA54A15}"/>
+                <a16:creationId xmlns:a16="http://schemas.microsoft.com/office/drawing/2014/main" id="{E1C2E2BD-DA25-448A-A9CB-C5F9A61FBA65}"/>
               </a:ext>
             </a:extLst>
           </p:cNvPr>
@@ -3246,7 +3662,7 @@
     </p:spTree>
     <p:extLst>
       <p:ext uri="{BB962C8B-B14F-4D97-AF65-F5344CB8AC3E}">
-        <p14:creationId xmlns:p14="http://schemas.microsoft.com/office/powerpoint/2010/main" val="1123635291"/>
+        <p14:creationId xmlns:p14="http://schemas.microsoft.com/office/powerpoint/2010/main" val="2487153568"/>
       </p:ext>
     </p:extLst>
   </p:cSld>
@@ -3278,7 +3694,7 @@
           <p:cNvPr id="2" name="Title 1">
             <a:extLst>
               <a:ext uri="{FF2B5EF4-FFF2-40B4-BE49-F238E27FC236}">
-                <a16:creationId xmlns:a16="http://schemas.microsoft.com/office/drawing/2014/main" id="{D79C9159-61BE-4DCE-86B6-7D7D541515EC}"/>
+                <a16:creationId xmlns:a16="http://schemas.microsoft.com/office/drawing/2014/main" id="{0D20457A-8F64-499F-B74C-400059EBCB6B}"/>
               </a:ext>
             </a:extLst>
           </p:cNvPr>
@@ -3316,7 +3732,7 @@
           <p:cNvPr id="3" name="Content Placeholder 2">
             <a:extLst>
               <a:ext uri="{FF2B5EF4-FFF2-40B4-BE49-F238E27FC236}">
-                <a16:creationId xmlns:a16="http://schemas.microsoft.com/office/drawing/2014/main" id="{0A0CAC12-C434-4F36-A690-EE45127E70AD}"/>
+                <a16:creationId xmlns:a16="http://schemas.microsoft.com/office/drawing/2014/main" id="{FE33AE03-C06F-43B3-90E3-7B7CE9F7AD7E}"/>
               </a:ext>
             </a:extLst>
           </p:cNvPr>
@@ -3407,7 +3823,7 @@
           <p:cNvPr id="4" name="Text Placeholder 3">
             <a:extLst>
               <a:ext uri="{FF2B5EF4-FFF2-40B4-BE49-F238E27FC236}">
-                <a16:creationId xmlns:a16="http://schemas.microsoft.com/office/drawing/2014/main" id="{53F39BDD-3906-49A6-AAEF-6ED2EBAEAD03}"/>
+                <a16:creationId xmlns:a16="http://schemas.microsoft.com/office/drawing/2014/main" id="{D5556D06-1D08-4ED7-8C80-59C9EEEF587D}"/>
               </a:ext>
             </a:extLst>
           </p:cNvPr>
@@ -3478,7 +3894,7 @@
           <p:cNvPr id="5" name="Date Placeholder 4">
             <a:extLst>
               <a:ext uri="{FF2B5EF4-FFF2-40B4-BE49-F238E27FC236}">
-                <a16:creationId xmlns:a16="http://schemas.microsoft.com/office/drawing/2014/main" id="{D0D36146-70E1-4CDD-BB7A-715EA4F75461}"/>
+                <a16:creationId xmlns:a16="http://schemas.microsoft.com/office/drawing/2014/main" id="{9F5BA7E7-A7F8-4992-8607-B8F2BF58D18D}"/>
               </a:ext>
             </a:extLst>
           </p:cNvPr>
@@ -3507,7 +3923,7 @@
           <p:cNvPr id="6" name="Footer Placeholder 5">
             <a:extLst>
               <a:ext uri="{FF2B5EF4-FFF2-40B4-BE49-F238E27FC236}">
-                <a16:creationId xmlns:a16="http://schemas.microsoft.com/office/drawing/2014/main" id="{FABF58A4-24AE-4E9D-BBC4-495325B8063E}"/>
+                <a16:creationId xmlns:a16="http://schemas.microsoft.com/office/drawing/2014/main" id="{B73D27B5-E122-46AB-8307-908BA6B97E6F}"/>
               </a:ext>
             </a:extLst>
           </p:cNvPr>
@@ -3532,7 +3948,7 @@
           <p:cNvPr id="7" name="Slide Number Placeholder 6">
             <a:extLst>
               <a:ext uri="{FF2B5EF4-FFF2-40B4-BE49-F238E27FC236}">
-                <a16:creationId xmlns:a16="http://schemas.microsoft.com/office/drawing/2014/main" id="{EBACF443-844D-435B-8CD6-51379F45E545}"/>
+                <a16:creationId xmlns:a16="http://schemas.microsoft.com/office/drawing/2014/main" id="{DC9F6E18-BCD7-4278-BDA6-98999B549351}"/>
               </a:ext>
             </a:extLst>
           </p:cNvPr>
@@ -3559,7 +3975,7 @@
     </p:spTree>
     <p:extLst>
       <p:ext uri="{BB962C8B-B14F-4D97-AF65-F5344CB8AC3E}">
-        <p14:creationId xmlns:p14="http://schemas.microsoft.com/office/powerpoint/2010/main" val="1501039701"/>
+        <p14:creationId xmlns:p14="http://schemas.microsoft.com/office/powerpoint/2010/main" val="2378868071"/>
       </p:ext>
     </p:extLst>
   </p:cSld>
@@ -3591,7 +4007,7 @@
           <p:cNvPr id="2" name="Title 1">
             <a:extLst>
               <a:ext uri="{FF2B5EF4-FFF2-40B4-BE49-F238E27FC236}">
-                <a16:creationId xmlns:a16="http://schemas.microsoft.com/office/drawing/2014/main" id="{D8DD0AAA-1151-4FFE-B9F0-2C8FAF0D9841}"/>
+                <a16:creationId xmlns:a16="http://schemas.microsoft.com/office/drawing/2014/main" id="{A7A1E408-57FD-4146-A236-85CB51A58797}"/>
               </a:ext>
             </a:extLst>
           </p:cNvPr>
@@ -3629,7 +4045,7 @@
           <p:cNvPr id="3" name="Picture Placeholder 2">
             <a:extLst>
               <a:ext uri="{FF2B5EF4-FFF2-40B4-BE49-F238E27FC236}">
-                <a16:creationId xmlns:a16="http://schemas.microsoft.com/office/drawing/2014/main" id="{35BBAA7F-145F-4099-908C-32C9EC1BB012}"/>
+                <a16:creationId xmlns:a16="http://schemas.microsoft.com/office/drawing/2014/main" id="{955C565F-B05E-4D81-8315-E8F6C6D1B940}"/>
               </a:ext>
             </a:extLst>
           </p:cNvPr>
@@ -3696,7 +4112,7 @@
           <p:cNvPr id="4" name="Text Placeholder 3">
             <a:extLst>
               <a:ext uri="{FF2B5EF4-FFF2-40B4-BE49-F238E27FC236}">
-                <a16:creationId xmlns:a16="http://schemas.microsoft.com/office/drawing/2014/main" id="{810B16E2-DA99-4997-8669-7282A9E19598}"/>
+                <a16:creationId xmlns:a16="http://schemas.microsoft.com/office/drawing/2014/main" id="{489B3E11-A702-418D-9758-AE9C9673D3B7}"/>
               </a:ext>
             </a:extLst>
           </p:cNvPr>
@@ -3767,7 +4183,7 @@
           <p:cNvPr id="5" name="Date Placeholder 4">
             <a:extLst>
               <a:ext uri="{FF2B5EF4-FFF2-40B4-BE49-F238E27FC236}">
-                <a16:creationId xmlns:a16="http://schemas.microsoft.com/office/drawing/2014/main" id="{9F50466A-7991-43E1-8D96-7E72476AA642}"/>
+                <a16:creationId xmlns:a16="http://schemas.microsoft.com/office/drawing/2014/main" id="{F539B323-CF31-42B0-8C52-0E69DBF4D165}"/>
               </a:ext>
             </a:extLst>
           </p:cNvPr>
@@ -3796,7 +4212,7 @@
           <p:cNvPr id="6" name="Footer Placeholder 5">
             <a:extLst>
               <a:ext uri="{FF2B5EF4-FFF2-40B4-BE49-F238E27FC236}">
-                <a16:creationId xmlns:a16="http://schemas.microsoft.com/office/drawing/2014/main" id="{8E6E8957-BF2C-4BC4-949D-F4FD779E5813}"/>
+                <a16:creationId xmlns:a16="http://schemas.microsoft.com/office/drawing/2014/main" id="{DD02130C-DA5E-4625-A9D1-2254472C5488}"/>
               </a:ext>
             </a:extLst>
           </p:cNvPr>
@@ -3821,7 +4237,7 @@
           <p:cNvPr id="7" name="Slide Number Placeholder 6">
             <a:extLst>
               <a:ext uri="{FF2B5EF4-FFF2-40B4-BE49-F238E27FC236}">
-                <a16:creationId xmlns:a16="http://schemas.microsoft.com/office/drawing/2014/main" id="{8CF2B7EF-A40B-4AFC-AF7E-984225A79E21}"/>
+                <a16:creationId xmlns:a16="http://schemas.microsoft.com/office/drawing/2014/main" id="{CBC479F2-1C89-4D34-AE5A-EB6371F7D7D9}"/>
               </a:ext>
             </a:extLst>
           </p:cNvPr>
@@ -3848,7 +4264,7 @@
     </p:spTree>
     <p:extLst>
       <p:ext uri="{BB962C8B-B14F-4D97-AF65-F5344CB8AC3E}">
-        <p14:creationId xmlns:p14="http://schemas.microsoft.com/office/powerpoint/2010/main" val="4112367166"/>
+        <p14:creationId xmlns:p14="http://schemas.microsoft.com/office/powerpoint/2010/main" val="3871333636"/>
       </p:ext>
     </p:extLst>
   </p:cSld>
@@ -3885,7 +4301,7 @@
           <p:cNvPr id="2" name="Title Placeholder 1">
             <a:extLst>
               <a:ext uri="{FF2B5EF4-FFF2-40B4-BE49-F238E27FC236}">
-                <a16:creationId xmlns:a16="http://schemas.microsoft.com/office/drawing/2014/main" id="{FC231408-14D4-49BA-A066-97FB157C37E7}"/>
+                <a16:creationId xmlns:a16="http://schemas.microsoft.com/office/drawing/2014/main" id="{1F147C8B-45B4-4788-BD78-3401CB1F40FC}"/>
               </a:ext>
             </a:extLst>
           </p:cNvPr>
@@ -3924,7 +4340,7 @@
           <p:cNvPr id="3" name="Text Placeholder 2">
             <a:extLst>
               <a:ext uri="{FF2B5EF4-FFF2-40B4-BE49-F238E27FC236}">
-                <a16:creationId xmlns:a16="http://schemas.microsoft.com/office/drawing/2014/main" id="{BD836D9E-9C61-4E66-A850-CEB64C2F2DDB}"/>
+                <a16:creationId xmlns:a16="http://schemas.microsoft.com/office/drawing/2014/main" id="{9448705B-AD09-4665-9E9A-A1CEA269AEC3}"/>
               </a:ext>
             </a:extLst>
           </p:cNvPr>
@@ -3992,7 +4408,7 @@
           <p:cNvPr id="4" name="Date Placeholder 3">
             <a:extLst>
               <a:ext uri="{FF2B5EF4-FFF2-40B4-BE49-F238E27FC236}">
-                <a16:creationId xmlns:a16="http://schemas.microsoft.com/office/drawing/2014/main" id="{D79E8608-F747-43A3-8394-DF6973D1EAA2}"/>
+                <a16:creationId xmlns:a16="http://schemas.microsoft.com/office/drawing/2014/main" id="{27791435-0E05-4E52-A9C2-19AD69DF388B}"/>
               </a:ext>
             </a:extLst>
           </p:cNvPr>
@@ -4039,7 +4455,7 @@
           <p:cNvPr id="5" name="Footer Placeholder 4">
             <a:extLst>
               <a:ext uri="{FF2B5EF4-FFF2-40B4-BE49-F238E27FC236}">
-                <a16:creationId xmlns:a16="http://schemas.microsoft.com/office/drawing/2014/main" id="{1C8DF0BA-D842-41B4-AB50-1615F032B1CC}"/>
+                <a16:creationId xmlns:a16="http://schemas.microsoft.com/office/drawing/2014/main" id="{EFC758AE-0553-47CA-84AD-89B7C2809088}"/>
               </a:ext>
             </a:extLst>
           </p:cNvPr>
@@ -4082,7 +4498,7 @@
           <p:cNvPr id="6" name="Slide Number Placeholder 5">
             <a:extLst>
               <a:ext uri="{FF2B5EF4-FFF2-40B4-BE49-F238E27FC236}">
-                <a16:creationId xmlns:a16="http://schemas.microsoft.com/office/drawing/2014/main" id="{7F82DE2C-3A68-4656-8F66-3E396A6BA3D8}"/>
+                <a16:creationId xmlns:a16="http://schemas.microsoft.com/office/drawing/2014/main" id="{81FC0F7D-8B9A-42AA-B576-411983179D34}"/>
               </a:ext>
             </a:extLst>
           </p:cNvPr>
@@ -4127,23 +4543,23 @@
     </p:spTree>
     <p:extLst>
       <p:ext uri="{BB962C8B-B14F-4D97-AF65-F5344CB8AC3E}">
-        <p14:creationId xmlns:p14="http://schemas.microsoft.com/office/powerpoint/2010/main" val="3911569202"/>
+        <p14:creationId xmlns:p14="http://schemas.microsoft.com/office/powerpoint/2010/main" val="3476119828"/>
       </p:ext>
     </p:extLst>
   </p:cSld>
   <p:clrMap bg1="lt1" tx1="dk1" bg2="lt2" tx2="dk2" accent1="accent1" accent2="accent2" accent3="accent3" accent4="accent4" accent5="accent5" accent6="accent6" hlink="hlink" folHlink="folHlink"/>
   <p:sldLayoutIdLst>
-    <p:sldLayoutId id="2147483889" r:id="rId1"/>
-    <p:sldLayoutId id="2147483890" r:id="rId2"/>
-    <p:sldLayoutId id="2147483891" r:id="rId3"/>
-    <p:sldLayoutId id="2147483892" r:id="rId4"/>
-    <p:sldLayoutId id="2147483893" r:id="rId5"/>
-    <p:sldLayoutId id="2147483894" r:id="rId6"/>
-    <p:sldLayoutId id="2147483895" r:id="rId7"/>
-    <p:sldLayoutId id="2147483896" r:id="rId8"/>
-    <p:sldLayoutId id="2147483897" r:id="rId9"/>
-    <p:sldLayoutId id="2147483898" r:id="rId10"/>
-    <p:sldLayoutId id="2147483899" r:id="rId11"/>
+    <p:sldLayoutId id="2147484056" r:id="rId1"/>
+    <p:sldLayoutId id="2147484057" r:id="rId2"/>
+    <p:sldLayoutId id="2147484058" r:id="rId3"/>
+    <p:sldLayoutId id="2147484059" r:id="rId4"/>
+    <p:sldLayoutId id="2147484060" r:id="rId5"/>
+    <p:sldLayoutId id="2147484061" r:id="rId6"/>
+    <p:sldLayoutId id="2147484062" r:id="rId7"/>
+    <p:sldLayoutId id="2147484063" r:id="rId8"/>
+    <p:sldLayoutId id="2147484064" r:id="rId9"/>
+    <p:sldLayoutId id="2147484065" r:id="rId10"/>
+    <p:sldLayoutId id="2147484066" r:id="rId11"/>
   </p:sldLayoutIdLst>
   <p:txStyles>
     <p:titleStyle>
@@ -4463,7 +4879,7 @@
         </p:nvSpPr>
         <p:spPr>
           <a:xfrm>
-            <a:off x="2551826" y="5385"/>
+            <a:off x="2634954" y="-38518"/>
             <a:ext cx="9169911" cy="897392"/>
           </a:xfrm>
         </p:spPr>
@@ -4607,7 +5023,7 @@
         </p:nvSpPr>
         <p:spPr>
           <a:xfrm>
-            <a:off x="6470901" y="5849495"/>
+            <a:off x="134119" y="5737890"/>
             <a:ext cx="4746172" cy="954107"/>
           </a:xfrm>
           <a:prstGeom prst="rect">
@@ -4638,13 +5054,6 @@
           </a:p>
           <a:p>
             <a:r>
-              <a:rPr lang="en-US" sz="1100" dirty="0">
-                <a:latin typeface="Poppins ExtraLight" panose="00000300000000000000" pitchFamily="2" charset="0"/>
-                <a:cs typeface="Poppins ExtraLight" panose="00000300000000000000" pitchFamily="2" charset="0"/>
-              </a:rPr>
-              <a:t>[ 1 ] </a:t>
-            </a:r>
-            <a:r>
               <a:rPr lang="sr-Latn-RS" sz="1100" dirty="0">
                 <a:latin typeface="Poppins ExtraLight" panose="00000300000000000000" pitchFamily="2" charset="0"/>
                 <a:cs typeface="Poppins ExtraLight" panose="00000300000000000000" pitchFamily="2" charset="0"/>
@@ -4679,366 +5088,12 @@
           </a:p>
         </p:txBody>
       </p:sp>
-      <mc:AlternateContent xmlns:mc="http://schemas.openxmlformats.org/markup-compatibility/2006" xmlns:a14="http://schemas.microsoft.com/office/drawing/2010/main">
-        <mc:Choice Requires="a14">
-          <p:sp>
-            <p:nvSpPr>
-              <p:cNvPr id="6" name="TextBox 5">
-                <a:extLst>
-                  <a:ext uri="{FF2B5EF4-FFF2-40B4-BE49-F238E27FC236}">
-                    <a16:creationId xmlns:a16="http://schemas.microsoft.com/office/drawing/2014/main" id="{07791512-E55D-43AD-9A98-E8B316636248}"/>
-                  </a:ext>
-                </a:extLst>
-              </p:cNvPr>
-              <p:cNvSpPr txBox="1"/>
-              <p:nvPr/>
-            </p:nvSpPr>
-            <p:spPr>
-              <a:xfrm>
-                <a:off x="217283" y="2742184"/>
-                <a:ext cx="4336869" cy="2994602"/>
-              </a:xfrm>
-              <a:prstGeom prst="rect">
-                <a:avLst/>
-              </a:prstGeom>
-              <a:noFill/>
-            </p:spPr>
-            <p:txBody>
-              <a:bodyPr wrap="square" rtlCol="0">
-                <a:spAutoFit/>
-              </a:bodyPr>
-              <a:lstStyle/>
-              <a:p>
-                <a:r>
-                  <a:rPr lang="sr-Latn-RS" sz="1200" b="1" dirty="0">
-                    <a:effectLst>
-                      <a:outerShdw blurRad="38100" dist="38100" dir="2700000" algn="tl">
-                        <a:srgbClr val="000000">
-                          <a:alpha val="43137"/>
-                        </a:srgbClr>
-                      </a:outerShdw>
-                    </a:effectLst>
-                    <a:latin typeface="Poppins ExtraLight" panose="00000300000000000000" pitchFamily="2" charset="0"/>
-                    <a:cs typeface="Poppins ExtraLight" panose="00000300000000000000" pitchFamily="2" charset="0"/>
-                  </a:rPr>
-                  <a:t>PROBLEM</a:t>
-                </a:r>
-              </a:p>
-              <a:p>
-                <a:r>
-                  <a:rPr lang="sr-Latn-RS" sz="1200" dirty="0">
-                    <a:latin typeface="Poppins ExtraLight" panose="00000300000000000000" pitchFamily="2" charset="0"/>
-                    <a:cs typeface="Poppins ExtraLight" panose="00000300000000000000" pitchFamily="2" charset="0"/>
-                  </a:rPr>
-                  <a:t>Na prvi pogled igra ne deluje toliko komplikovana. Međutim, broj pozicija na koje se mogu postaviti zidovi je veliki i to dosta povećava kompleksnost igre.</a:t>
-                </a:r>
-              </a:p>
-              <a:p>
-                <a:r>
-                  <a:rPr lang="sr-Latn-RS" sz="1200" dirty="0">
-                    <a:latin typeface="Poppins ExtraLight" panose="00000300000000000000" pitchFamily="2" charset="0"/>
-                    <a:cs typeface="Poppins ExtraLight" panose="00000300000000000000" pitchFamily="2" charset="0"/>
-                  </a:rPr>
-                  <a:t>Pošto postoji 128 mesta na koje se zidovi mogu smestiti, i svaki zid dodiruje 4 polja i ukupno postoji 20 zidova, ukupan broj pozicija na koje se zidovi mogu smestiti se može lako izračunati preko sledeće formule </a:t>
-                </a:r>
-                <a:r>
-                  <a:rPr lang="en-US" sz="1200" dirty="0">
-                    <a:latin typeface="Poppins ExtraLight" panose="00000300000000000000" pitchFamily="2" charset="0"/>
-                    <a:cs typeface="Poppins ExtraLight" panose="00000300000000000000" pitchFamily="2" charset="0"/>
-                  </a:rPr>
-                  <a:t>[ 1 ]:</a:t>
-                </a:r>
-                <a:endParaRPr lang="sr-Latn-RS" sz="1200" dirty="0">
-                  <a:latin typeface="Poppins ExtraLight" panose="00000300000000000000" pitchFamily="2" charset="0"/>
-                  <a:cs typeface="Poppins ExtraLight" panose="00000300000000000000" pitchFamily="2" charset="0"/>
-                </a:endParaRPr>
-              </a:p>
-              <a:p>
-                <a:pPr/>
-                <a14:m>
-                  <m:oMathPara xmlns:m="http://schemas.openxmlformats.org/officeDocument/2006/math">
-                    <m:oMathParaPr>
-                      <m:jc m:val="centerGroup"/>
-                    </m:oMathParaPr>
-                    <m:oMath xmlns:m="http://schemas.openxmlformats.org/officeDocument/2006/math">
-                      <m:nary>
-                        <m:naryPr>
-                          <m:chr m:val="∑"/>
-                          <m:limLoc m:val="undOvr"/>
-                          <m:grow m:val="on"/>
-                          <m:ctrlPr>
-                            <a:rPr lang="sr-Latn-RS" sz="1200" i="1" smtClean="0">
-                              <a:latin typeface="Cambria Math" panose="02040503050406030204" pitchFamily="18" charset="0"/>
-                            </a:rPr>
-                          </m:ctrlPr>
-                        </m:naryPr>
-                        <m:sub>
-                          <m:r>
-                            <a:rPr lang="sr-Latn-RS" sz="1200" i="1" smtClean="0">
-                              <a:latin typeface="Cambria Math" panose="02040503050406030204" pitchFamily="18" charset="0"/>
-                            </a:rPr>
-                            <m:t>𝑖</m:t>
-                          </m:r>
-                          <m:r>
-                            <a:rPr lang="sr-Latn-RS" sz="1200" i="1" smtClean="0">
-                              <a:latin typeface="Cambria Math" panose="02040503050406030204" pitchFamily="18" charset="0"/>
-                            </a:rPr>
-                            <m:t>=0</m:t>
-                          </m:r>
-                        </m:sub>
-                        <m:sup>
-                          <m:r>
-                            <a:rPr lang="sr-Latn-RS" sz="1200" i="1" smtClean="0">
-                              <a:latin typeface="Cambria Math" panose="02040503050406030204" pitchFamily="18" charset="0"/>
-                            </a:rPr>
-                            <m:t>20</m:t>
-                          </m:r>
-                        </m:sup>
-                        <m:e>
-                          <m:nary>
-                            <m:naryPr>
-                              <m:chr m:val="∏"/>
-                              <m:limLoc m:val="undOvr"/>
-                              <m:grow m:val="on"/>
-                              <m:ctrlPr>
-                                <a:rPr lang="sr-Latn-RS" sz="1200" i="1" smtClean="0">
-                                  <a:latin typeface="Cambria Math" panose="02040503050406030204" pitchFamily="18" charset="0"/>
-                                </a:rPr>
-                              </m:ctrlPr>
-                            </m:naryPr>
-                            <m:sub>
-                              <m:r>
-                                <a:rPr lang="sr-Latn-RS" sz="1200" i="1" smtClean="0">
-                                  <a:latin typeface="Cambria Math" panose="02040503050406030204" pitchFamily="18" charset="0"/>
-                                </a:rPr>
-                                <m:t>𝑗</m:t>
-                              </m:r>
-                              <m:r>
-                                <a:rPr lang="sr-Latn-RS" sz="1200" i="1" smtClean="0">
-                                  <a:latin typeface="Cambria Math" panose="02040503050406030204" pitchFamily="18" charset="0"/>
-                                </a:rPr>
-                                <m:t>=0</m:t>
-                              </m:r>
-                            </m:sub>
-                            <m:sup>
-                              <m:r>
-                                <a:rPr lang="sr-Latn-RS" sz="1200" i="1" smtClean="0">
-                                  <a:latin typeface="Cambria Math" panose="02040503050406030204" pitchFamily="18" charset="0"/>
-                                </a:rPr>
-                                <m:t>𝑖</m:t>
-                              </m:r>
-                            </m:sup>
-                            <m:e>
-                              <m:d>
-                                <m:dPr>
-                                  <m:ctrlPr>
-                                    <a:rPr lang="sr-Latn-RS" sz="1200" i="1" smtClean="0">
-                                      <a:solidFill>
-                                        <a:srgbClr val="836967"/>
-                                      </a:solidFill>
-                                      <a:latin typeface="Cambria Math" panose="02040503050406030204" pitchFamily="18" charset="0"/>
-                                    </a:rPr>
-                                  </m:ctrlPr>
-                                </m:dPr>
-                                <m:e>
-                                  <m:r>
-                                    <a:rPr lang="sr-Latn-RS" sz="1200" i="1" smtClean="0">
-                                      <a:latin typeface="Cambria Math" panose="02040503050406030204" pitchFamily="18" charset="0"/>
-                                    </a:rPr>
-                                    <m:t>128−4</m:t>
-                                  </m:r>
-                                  <m:r>
-                                    <a:rPr lang="sr-Latn-RS" sz="1200" i="1" smtClean="0">
-                                      <a:latin typeface="Cambria Math" panose="02040503050406030204" pitchFamily="18" charset="0"/>
-                                    </a:rPr>
-                                    <m:t>𝑖</m:t>
-                                  </m:r>
-                                </m:e>
-                              </m:d>
-                            </m:e>
-                          </m:nary>
-                        </m:e>
-                      </m:nary>
-                      <m:r>
-                        <a:rPr lang="sr-Latn-RS" sz="1200" i="1" smtClean="0">
-                          <a:latin typeface="Cambria Math" panose="02040503050406030204" pitchFamily="18" charset="0"/>
-                        </a:rPr>
-                        <m:t>=6.1582×</m:t>
-                      </m:r>
-                      <m:sSup>
-                        <m:sSupPr>
-                          <m:ctrlPr>
-                            <a:rPr lang="sr-Latn-RS" sz="1200" i="1" smtClean="0">
-                              <a:solidFill>
-                                <a:srgbClr val="836967"/>
-                              </a:solidFill>
-                              <a:latin typeface="Cambria Math" panose="02040503050406030204" pitchFamily="18" charset="0"/>
-                            </a:rPr>
-                          </m:ctrlPr>
-                        </m:sSupPr>
-                        <m:e>
-                          <m:r>
-                            <a:rPr lang="sr-Latn-RS" sz="1200" i="1" smtClean="0">
-                              <a:latin typeface="Cambria Math" panose="02040503050406030204" pitchFamily="18" charset="0"/>
-                            </a:rPr>
-                            <m:t>10</m:t>
-                          </m:r>
-                        </m:e>
-                        <m:sup>
-                          <m:r>
-                            <a:rPr lang="sr-Latn-RS" sz="1200" i="1" smtClean="0">
-                              <a:latin typeface="Cambria Math" panose="02040503050406030204" pitchFamily="18" charset="0"/>
-                            </a:rPr>
-                            <m:t>38</m:t>
-                          </m:r>
-                        </m:sup>
-                      </m:sSup>
-                    </m:oMath>
-                  </m:oMathPara>
-                </a14:m>
-                <a:endParaRPr lang="sr-Latn-RS" sz="1200" dirty="0">
-                  <a:latin typeface="Poppins ExtraLight" panose="00000300000000000000" pitchFamily="2" charset="0"/>
-                  <a:cs typeface="Poppins ExtraLight" panose="00000300000000000000" pitchFamily="2" charset="0"/>
-                </a:endParaRPr>
-              </a:p>
-              <a:p>
-                <a:endParaRPr lang="sr-Latn-RS" sz="1200" dirty="0">
-                  <a:latin typeface="Poppins ExtraLight" panose="00000300000000000000" pitchFamily="2" charset="0"/>
-                  <a:cs typeface="Poppins ExtraLight" panose="00000300000000000000" pitchFamily="2" charset="0"/>
-                </a:endParaRPr>
-              </a:p>
-              <a:p>
-                <a:r>
-                  <a:rPr lang="sr-Latn-RS" sz="1200" dirty="0">
-                    <a:latin typeface="Poppins ExtraLight" panose="00000300000000000000" pitchFamily="2" charset="0"/>
-                    <a:cs typeface="Poppins ExtraLight" panose="00000300000000000000" pitchFamily="2" charset="0"/>
-                  </a:rPr>
-                  <a:t>Kompleksnost stabla igre prevazilazi čak i šah, kod kog je ona</a:t>
-                </a:r>
-                <a:r>
-                  <a:rPr lang="en-US" sz="1200" dirty="0">
-                    <a:latin typeface="Poppins ExtraLight" panose="00000300000000000000" pitchFamily="2" charset="0"/>
-                    <a:cs typeface="Poppins ExtraLight" panose="00000300000000000000" pitchFamily="2" charset="0"/>
-                  </a:rPr>
-                  <a:t> 10</a:t>
-                </a:r>
-                <a:r>
-                  <a:rPr lang="en-US" sz="1200" baseline="30000" dirty="0">
-                    <a:latin typeface="Poppins ExtraLight" panose="00000300000000000000" pitchFamily="2" charset="0"/>
-                    <a:cs typeface="Poppins ExtraLight" panose="00000300000000000000" pitchFamily="2" charset="0"/>
-                  </a:rPr>
-                  <a:t>123 </a:t>
-                </a:r>
-                <a:r>
-                  <a:rPr lang="en-US" sz="1200" dirty="0">
-                    <a:latin typeface="Poppins ExtraLight" panose="00000300000000000000" pitchFamily="2" charset="0"/>
-                    <a:cs typeface="Poppins ExtraLight" panose="00000300000000000000" pitchFamily="2" charset="0"/>
-                  </a:rPr>
-                  <a:t>, a </a:t>
-                </a:r>
-                <a:r>
-                  <a:rPr lang="en-US" sz="1200" dirty="0" err="1">
-                    <a:latin typeface="Poppins ExtraLight" panose="00000300000000000000" pitchFamily="2" charset="0"/>
-                    <a:cs typeface="Poppins ExtraLight" panose="00000300000000000000" pitchFamily="2" charset="0"/>
-                  </a:rPr>
-                  <a:t>kod</a:t>
-                </a:r>
-                <a:r>
-                  <a:rPr lang="en-US" sz="1200" dirty="0">
-                    <a:latin typeface="Poppins ExtraLight" panose="00000300000000000000" pitchFamily="2" charset="0"/>
-                    <a:cs typeface="Poppins ExtraLight" panose="00000300000000000000" pitchFamily="2" charset="0"/>
-                  </a:rPr>
-                  <a:t> </a:t>
-                </a:r>
-                <a:r>
-                  <a:rPr lang="en-US" sz="1200" dirty="0" err="1">
-                    <a:latin typeface="Poppins ExtraLight" panose="00000300000000000000" pitchFamily="2" charset="0"/>
-                    <a:cs typeface="Poppins ExtraLight" panose="00000300000000000000" pitchFamily="2" charset="0"/>
-                  </a:rPr>
-                  <a:t>quoridor</a:t>
-                </a:r>
-                <a:r>
-                  <a:rPr lang="en-US" sz="1200" dirty="0">
-                    <a:latin typeface="Poppins ExtraLight" panose="00000300000000000000" pitchFamily="2" charset="0"/>
-                    <a:cs typeface="Poppins ExtraLight" panose="00000300000000000000" pitchFamily="2" charset="0"/>
-                  </a:rPr>
-                  <a:t>-a 10</a:t>
-                </a:r>
-                <a:r>
-                  <a:rPr lang="en-US" sz="1200" baseline="30000" dirty="0">
-                    <a:latin typeface="Poppins ExtraLight" panose="00000300000000000000" pitchFamily="2" charset="0"/>
-                    <a:cs typeface="Poppins ExtraLight" panose="00000300000000000000" pitchFamily="2" charset="0"/>
-                  </a:rPr>
-                  <a:t>162 </a:t>
-                </a:r>
-                <a:r>
-                  <a:rPr lang="en-US" sz="1200" dirty="0">
-                    <a:latin typeface="Poppins ExtraLight" panose="00000300000000000000" pitchFamily="2" charset="0"/>
-                    <a:cs typeface="Poppins ExtraLight" panose="00000300000000000000" pitchFamily="2" charset="0"/>
-                  </a:rPr>
-                  <a:t>. </a:t>
-                </a:r>
-                <a:endParaRPr lang="sr-Latn-RS" sz="1800" dirty="0">
-                  <a:effectLst/>
-                  <a:latin typeface="Calibri" panose="020F0502020204030204" pitchFamily="34" charset="0"/>
-                  <a:ea typeface="Calibri" panose="020F0502020204030204" pitchFamily="34" charset="0"/>
-                  <a:cs typeface="Times New Roman" panose="02020603050405020304" pitchFamily="18" charset="0"/>
-                </a:endParaRPr>
-              </a:p>
-            </p:txBody>
-          </p:sp>
-        </mc:Choice>
-        <mc:Fallback xmlns="">
-          <p:sp>
-            <p:nvSpPr>
-              <p:cNvPr id="6" name="TextBox 5">
-                <a:extLst>
-                  <a:ext uri="{FF2B5EF4-FFF2-40B4-BE49-F238E27FC236}">
-                    <a16:creationId xmlns:a16="http://schemas.microsoft.com/office/drawing/2014/main" id="{07791512-E55D-43AD-9A98-E8B316636248}"/>
-                  </a:ext>
-                </a:extLst>
-              </p:cNvPr>
-              <p:cNvSpPr txBox="1">
-                <a:spLocks noRot="1" noChangeAspect="1" noMove="1" noResize="1" noEditPoints="1" noAdjustHandles="1" noChangeArrowheads="1" noChangeShapeType="1" noTextEdit="1"/>
-              </p:cNvSpPr>
-              <p:nvPr/>
-            </p:nvSpPr>
-            <p:spPr>
-              <a:xfrm>
-                <a:off x="217283" y="2742184"/>
-                <a:ext cx="4336869" cy="2994602"/>
-              </a:xfrm>
-              <a:prstGeom prst="rect">
-                <a:avLst/>
-              </a:prstGeom>
-              <a:blipFill>
-                <a:blip r:embed="rId3"/>
-                <a:stretch>
-                  <a:fillRect l="-141" t="-204" b="-815"/>
-                </a:stretch>
-              </a:blipFill>
-            </p:spPr>
-            <p:txBody>
-              <a:bodyPr/>
-              <a:lstStyle/>
-              <a:p>
-                <a:r>
-                  <a:rPr lang="sr-Latn-RS">
-                    <a:noFill/>
-                  </a:rPr>
-                  <a:t> </a:t>
-                </a:r>
-              </a:p>
-            </p:txBody>
-          </p:sp>
-        </mc:Fallback>
-      </mc:AlternateContent>
-      <p:sp>
-        <p:nvSpPr>
-          <p:cNvPr id="7" name="TextBox 6">
-            <a:extLst>
-              <a:ext uri="{FF2B5EF4-FFF2-40B4-BE49-F238E27FC236}">
-                <a16:creationId xmlns:a16="http://schemas.microsoft.com/office/drawing/2014/main" id="{A9188276-64C8-405B-B466-1BD325FF6D04}"/>
+      <p:sp>
+        <p:nvSpPr>
+          <p:cNvPr id="6" name="TextBox 5">
+            <a:extLst>
+              <a:ext uri="{FF2B5EF4-FFF2-40B4-BE49-F238E27FC236}">
+                <a16:creationId xmlns:a16="http://schemas.microsoft.com/office/drawing/2014/main" id="{07791512-E55D-43AD-9A98-E8B316636248}"/>
               </a:ext>
             </a:extLst>
           </p:cNvPr>
@@ -5047,7 +5102,184 @@
         </p:nvSpPr>
         <p:spPr>
           <a:xfrm>
-            <a:off x="8931504" y="753055"/>
+            <a:off x="217283" y="1812339"/>
+            <a:ext cx="4336869" cy="2123658"/>
+          </a:xfrm>
+          <a:prstGeom prst="rect">
+            <a:avLst/>
+          </a:prstGeom>
+          <a:noFill/>
+        </p:spPr>
+        <p:txBody>
+          <a:bodyPr wrap="square" rtlCol="0">
+            <a:spAutoFit/>
+          </a:bodyPr>
+          <a:lstStyle/>
+          <a:p>
+            <a:r>
+              <a:rPr lang="sr-Latn-RS" sz="1200" b="1" dirty="0">
+                <a:effectLst>
+                  <a:outerShdw blurRad="38100" dist="38100" dir="2700000" algn="tl">
+                    <a:srgbClr val="000000">
+                      <a:alpha val="43137"/>
+                    </a:srgbClr>
+                  </a:outerShdw>
+                </a:effectLst>
+                <a:latin typeface="Poppins ExtraLight" panose="00000300000000000000" pitchFamily="2" charset="0"/>
+                <a:cs typeface="Poppins ExtraLight" panose="00000300000000000000" pitchFamily="2" charset="0"/>
+              </a:rPr>
+              <a:t>PROBLEM</a:t>
+            </a:r>
+          </a:p>
+          <a:p>
+            <a:r>
+              <a:rPr lang="sr-Latn-RS" sz="1200" dirty="0">
+                <a:latin typeface="Poppins ExtraLight" panose="00000300000000000000" pitchFamily="2" charset="0"/>
+                <a:cs typeface="Poppins ExtraLight" panose="00000300000000000000" pitchFamily="2" charset="0"/>
+              </a:rPr>
+              <a:t>Na prvi pogled igra ne deluje toliko komplikovana. Međutim, broj pozicija na koje se mogu postaviti zidovi je veliki i to dosta povećava kompleksnost igre.</a:t>
+            </a:r>
+          </a:p>
+          <a:p>
+            <a:r>
+              <a:rPr lang="sr-Latn-RS" sz="1200" dirty="0">
+                <a:latin typeface="Poppins ExtraLight" panose="00000300000000000000" pitchFamily="2" charset="0"/>
+                <a:cs typeface="Poppins ExtraLight" panose="00000300000000000000" pitchFamily="2" charset="0"/>
+              </a:rPr>
+              <a:t>Pošto postoji 128 mesta na koje se zidovi mogu smestiti, i svaki zid dodiruje 4 polja i ukupno postoji 20 zidova, ukupan broj pozicija na koje se zidovi mogu smestiti se </a:t>
+            </a:r>
+            <a:r>
+              <a:rPr lang="en-US" sz="1200" dirty="0">
+                <a:latin typeface="Poppins ExtraLight" panose="00000300000000000000" pitchFamily="2" charset="0"/>
+                <a:cs typeface="Poppins ExtraLight" panose="00000300000000000000" pitchFamily="2" charset="0"/>
+              </a:rPr>
+              <a:t> </a:t>
+            </a:r>
+            <a:r>
+              <a:rPr lang="en-US" sz="1200" dirty="0" err="1">
+                <a:latin typeface="Poppins ExtraLight" panose="00000300000000000000" pitchFamily="2" charset="0"/>
+                <a:cs typeface="Poppins ExtraLight" panose="00000300000000000000" pitchFamily="2" charset="0"/>
+              </a:rPr>
+              <a:t>ubrzano</a:t>
+            </a:r>
+            <a:r>
+              <a:rPr lang="en-US" sz="1200" dirty="0">
+                <a:latin typeface="Poppins ExtraLight" panose="00000300000000000000" pitchFamily="2" charset="0"/>
+                <a:cs typeface="Poppins ExtraLight" panose="00000300000000000000" pitchFamily="2" charset="0"/>
+              </a:rPr>
+              <a:t> </a:t>
+            </a:r>
+            <a:r>
+              <a:rPr lang="en-US" sz="1200" dirty="0" err="1">
+                <a:latin typeface="Poppins ExtraLight" panose="00000300000000000000" pitchFamily="2" charset="0"/>
+                <a:cs typeface="Poppins ExtraLight" panose="00000300000000000000" pitchFamily="2" charset="0"/>
+              </a:rPr>
+              <a:t>pove</a:t>
+            </a:r>
+            <a:r>
+              <a:rPr lang="sr-Latn-RS" sz="1200" dirty="0">
+                <a:latin typeface="Poppins ExtraLight" panose="00000300000000000000" pitchFamily="2" charset="0"/>
+                <a:cs typeface="Poppins ExtraLight" panose="00000300000000000000" pitchFamily="2" charset="0"/>
+              </a:rPr>
+              <a:t>ćava kompleksnost stabla pretrage, koja iznosi </a:t>
+            </a:r>
+            <a:r>
+              <a:rPr lang="en-US" sz="1200" dirty="0">
+                <a:latin typeface="Poppins ExtraLight" panose="00000300000000000000" pitchFamily="2" charset="0"/>
+                <a:cs typeface="Poppins ExtraLight" panose="00000300000000000000" pitchFamily="2" charset="0"/>
+              </a:rPr>
+              <a:t>10</a:t>
+            </a:r>
+            <a:r>
+              <a:rPr lang="en-US" sz="1200" baseline="30000" dirty="0">
+                <a:latin typeface="Poppins ExtraLight" panose="00000300000000000000" pitchFamily="2" charset="0"/>
+                <a:cs typeface="Poppins ExtraLight" panose="00000300000000000000" pitchFamily="2" charset="0"/>
+              </a:rPr>
+              <a:t>162</a:t>
+            </a:r>
+            <a:r>
+              <a:rPr lang="sr-Latn-RS" sz="1200" baseline="30000" dirty="0">
+                <a:latin typeface="Poppins ExtraLight" panose="00000300000000000000" pitchFamily="2" charset="0"/>
+                <a:cs typeface="Poppins ExtraLight" panose="00000300000000000000" pitchFamily="2" charset="0"/>
+              </a:rPr>
+              <a:t> </a:t>
+            </a:r>
+            <a:r>
+              <a:rPr lang="en-US" sz="1200" baseline="30000" dirty="0">
+                <a:latin typeface="Poppins ExtraLight" panose="00000300000000000000" pitchFamily="2" charset="0"/>
+                <a:cs typeface="Poppins ExtraLight" panose="00000300000000000000" pitchFamily="2" charset="0"/>
+              </a:rPr>
+              <a:t> </a:t>
+            </a:r>
+            <a:r>
+              <a:rPr lang="en-US" sz="1200" dirty="0">
+                <a:latin typeface="Poppins ExtraLight" panose="00000300000000000000" pitchFamily="2" charset="0"/>
+                <a:cs typeface="Poppins ExtraLight" panose="00000300000000000000" pitchFamily="2" charset="0"/>
+              </a:rPr>
+              <a:t>[ 1 ]</a:t>
+            </a:r>
+            <a:r>
+              <a:rPr lang="sr-Latn-RS" sz="1200" baseline="30000" dirty="0">
+                <a:latin typeface="Poppins ExtraLight" panose="00000300000000000000" pitchFamily="2" charset="0"/>
+                <a:cs typeface="Poppins ExtraLight" panose="00000300000000000000" pitchFamily="2" charset="0"/>
+              </a:rPr>
+              <a:t> </a:t>
+            </a:r>
+            <a:r>
+              <a:rPr lang="sr-Latn-RS" sz="1200" dirty="0">
+                <a:latin typeface="Poppins ExtraLight" panose="00000300000000000000" pitchFamily="2" charset="0"/>
+                <a:cs typeface="Poppins ExtraLight" panose="00000300000000000000" pitchFamily="2" charset="0"/>
+              </a:rPr>
+              <a:t>. To prevazilazi čak i šah, čija je kompleksnost</a:t>
+            </a:r>
+          </a:p>
+          <a:p>
+            <a:r>
+              <a:rPr lang="en-US" sz="1200" dirty="0">
+                <a:latin typeface="Poppins ExtraLight" panose="00000300000000000000" pitchFamily="2" charset="0"/>
+                <a:cs typeface="Poppins ExtraLight" panose="00000300000000000000" pitchFamily="2" charset="0"/>
+              </a:rPr>
+              <a:t>10</a:t>
+            </a:r>
+            <a:r>
+              <a:rPr lang="en-US" sz="1200" baseline="30000" dirty="0">
+                <a:latin typeface="Poppins ExtraLight" panose="00000300000000000000" pitchFamily="2" charset="0"/>
+                <a:cs typeface="Poppins ExtraLight" panose="00000300000000000000" pitchFamily="2" charset="0"/>
+              </a:rPr>
+              <a:t>123</a:t>
+            </a:r>
+            <a:r>
+              <a:rPr lang="sr-Latn-RS" sz="1200" baseline="30000" dirty="0">
+                <a:latin typeface="Poppins ExtraLight" panose="00000300000000000000" pitchFamily="2" charset="0"/>
+                <a:cs typeface="Poppins ExtraLight" panose="00000300000000000000" pitchFamily="2" charset="0"/>
+              </a:rPr>
+              <a:t> </a:t>
+            </a:r>
+            <a:r>
+              <a:rPr lang="sr-Latn-RS" sz="1200" dirty="0">
+                <a:latin typeface="Poppins ExtraLight" panose="00000300000000000000" pitchFamily="2" charset="0"/>
+                <a:cs typeface="Poppins ExtraLight" panose="00000300000000000000" pitchFamily="2" charset="0"/>
+              </a:rPr>
+              <a:t>.</a:t>
+            </a:r>
+          </a:p>
+        </p:txBody>
+      </p:sp>
+      <p:sp>
+        <p:nvSpPr>
+          <p:cNvPr id="7" name="TextBox 6">
+            <a:extLst>
+              <a:ext uri="{FF2B5EF4-FFF2-40B4-BE49-F238E27FC236}">
+                <a16:creationId xmlns:a16="http://schemas.microsoft.com/office/drawing/2014/main" id="{A9188276-64C8-405B-B466-1BD325FF6D04}"/>
+              </a:ext>
+            </a:extLst>
+          </p:cNvPr>
+          <p:cNvSpPr txBox="1"/>
+          <p:nvPr/>
+        </p:nvSpPr>
+        <p:spPr>
+          <a:xfrm>
+            <a:off x="2507205" y="3822753"/>
             <a:ext cx="3126377" cy="1200329"/>
           </a:xfrm>
           <a:prstGeom prst="rect">
@@ -5326,7 +5558,7 @@
         </p:nvGrpSpPr>
         <p:grpSpPr>
           <a:xfrm>
-            <a:off x="6470901" y="749109"/>
+            <a:off x="295228" y="3848780"/>
             <a:ext cx="2211977" cy="1731716"/>
             <a:chOff x="6775269" y="1266170"/>
             <a:chExt cx="2211977" cy="1731716"/>
@@ -5347,7 +5579,7 @@
             <p:nvPr/>
           </p:nvPicPr>
           <p:blipFill>
-            <a:blip r:embed="rId4">
+            <a:blip r:embed="rId3">
               <a:extLst>
                 <a:ext uri="{28A0092B-C50C-407E-A947-70E740481C1C}">
                   <a14:useLocalDpi xmlns:a14="http://schemas.microsoft.com/office/drawing/2010/main" val="0"/>
@@ -5439,7 +5671,7 @@
         </p:nvSpPr>
         <p:spPr>
           <a:xfrm>
-            <a:off x="6470901" y="2505695"/>
+            <a:off x="6554029" y="749109"/>
             <a:ext cx="5250836" cy="1015663"/>
           </a:xfrm>
           <a:prstGeom prst="rect">
@@ -5526,18 +5758,18 @@
           <p:nvPr>
             <p:extLst>
               <p:ext uri="{D42A27DB-BD31-4B8C-83A1-F6EECF244321}">
-                <p14:modId xmlns:p14="http://schemas.microsoft.com/office/powerpoint/2010/main" val="4292936544"/>
+                <p14:modId xmlns:p14="http://schemas.microsoft.com/office/powerpoint/2010/main" val="1820770666"/>
               </p:ext>
             </p:extLst>
           </p:nvPr>
         </p:nvGraphicFramePr>
         <p:xfrm>
-          <a:off x="6360065" y="2480825"/>
-          <a:ext cx="5968385" cy="3112968"/>
+          <a:off x="5633582" y="1764773"/>
+          <a:ext cx="6424300" cy="4344118"/>
         </p:xfrm>
         <a:graphic>
           <a:graphicData uri="http://schemas.openxmlformats.org/drawingml/2006/chart">
-            <c:chart xmlns:c="http://schemas.openxmlformats.org/drawingml/2006/chart" xmlns:r="http://schemas.openxmlformats.org/officeDocument/2006/relationships" r:id="rId5"/>
+            <c:chart xmlns:c="http://schemas.openxmlformats.org/drawingml/2006/chart" xmlns:r="http://schemas.openxmlformats.org/officeDocument/2006/relationships" r:id="rId4"/>
           </a:graphicData>
         </a:graphic>
       </p:graphicFrame>
@@ -5555,8 +5787,8 @@
         </p:nvSpPr>
         <p:spPr>
           <a:xfrm>
-            <a:off x="6548545" y="5486071"/>
-            <a:ext cx="5426172" cy="338554"/>
+            <a:off x="6361660" y="6108891"/>
+            <a:ext cx="4968143" cy="338554"/>
           </a:xfrm>
           <a:prstGeom prst="rect">
             <a:avLst/>

</xml_diff>